<commit_message>
fixed bugs with toolhead settings and run bounding box
</commit_message>
<xml_diff>
--- a/GUI_files/resources/resources_edit.pptx
+++ b/GUI_files/resources/resources_edit.pptx
@@ -10,6 +10,12 @@
     <p:sldId id="260" r:id="rId4"/>
     <p:sldId id="261" r:id="rId5"/>
     <p:sldId id="262" r:id="rId6"/>
+    <p:sldId id="263" r:id="rId7"/>
+    <p:sldId id="264" r:id="rId8"/>
+    <p:sldId id="269" r:id="rId9"/>
+    <p:sldId id="265" r:id="rId10"/>
+    <p:sldId id="267" r:id="rId11"/>
+    <p:sldId id="266" r:id="rId12"/>
   </p:sldIdLst>
   <p:sldSz cx="9144000" cy="6858000" type="screen4x3"/>
   <p:notesSz cx="6858000" cy="9144000"/>
@@ -108,6 +114,22 @@
       </a:defRPr>
     </a:lvl9pPr>
   </p:defaultTextStyle>
+  <p:extLst>
+    <p:ext uri="{EFAFB233-063F-42B5-8137-9DF3F51BA10A}">
+      <p15:sldGuideLst xmlns:p15="http://schemas.microsoft.com/office/powerpoint/2012/main">
+        <p15:guide id="1" orient="horz" pos="2160">
+          <p15:clr>
+            <a:srgbClr val="A4A3A4"/>
+          </p15:clr>
+        </p15:guide>
+        <p15:guide id="2" pos="2880">
+          <p15:clr>
+            <a:srgbClr val="A4A3A4"/>
+          </p15:clr>
+        </p15:guide>
+      </p15:sldGuideLst>
+    </p:ext>
+  </p:extLst>
 </p:presentation>
 </file>
 
@@ -149,10 +171,9 @@
           <a:lstStyle/>
           <a:p>
             <a:r>
-              <a:rPr lang="de-DE" smtClean="0"/>
+              <a:rPr lang="de-DE"/>
               <a:t>Titelmasterformat durch Klicken bearbeiten</a:t>
             </a:r>
-            <a:endParaRPr lang="de-DE"/>
           </a:p>
         </p:txBody>
       </p:sp>
@@ -268,10 +289,9 @@
           </a:lstStyle>
           <a:p>
             <a:r>
-              <a:rPr lang="de-DE" smtClean="0"/>
+              <a:rPr lang="de-DE"/>
               <a:t>Formatvorlage des Untertitelmasters durch Klicken bearbeiten</a:t>
             </a:r>
-            <a:endParaRPr lang="de-DE"/>
           </a:p>
         </p:txBody>
       </p:sp>
@@ -292,7 +312,7 @@
           <a:p>
             <a:fld id="{8D1E506D-564B-415C-99DD-7751041BB7A0}" type="datetimeFigureOut">
               <a:rPr lang="de-DE" smtClean="0"/>
-              <a:t>21.09.2025</a:t>
+              <a:t>28.09.2025</a:t>
             </a:fld>
             <a:endParaRPr lang="de-DE"/>
           </a:p>
@@ -386,10 +406,9 @@
           <a:lstStyle/>
           <a:p>
             <a:r>
-              <a:rPr lang="de-DE" smtClean="0"/>
+              <a:rPr lang="de-DE"/>
               <a:t>Titelmasterformat durch Klicken bearbeiten</a:t>
             </a:r>
-            <a:endParaRPr lang="de-DE"/>
           </a:p>
         </p:txBody>
       </p:sp>
@@ -410,38 +429,37 @@
           <a:p>
             <a:pPr lvl="0"/>
             <a:r>
-              <a:rPr lang="de-DE" smtClean="0"/>
+              <a:rPr lang="de-DE"/>
               <a:t>Textmasterformat bearbeiten</a:t>
             </a:r>
           </a:p>
           <a:p>
             <a:pPr lvl="1"/>
             <a:r>
-              <a:rPr lang="de-DE" smtClean="0"/>
+              <a:rPr lang="de-DE"/>
               <a:t>Zweite Ebene</a:t>
             </a:r>
           </a:p>
           <a:p>
             <a:pPr lvl="2"/>
             <a:r>
-              <a:rPr lang="de-DE" smtClean="0"/>
+              <a:rPr lang="de-DE"/>
               <a:t>Dritte Ebene</a:t>
             </a:r>
           </a:p>
           <a:p>
             <a:pPr lvl="3"/>
             <a:r>
-              <a:rPr lang="de-DE" smtClean="0"/>
+              <a:rPr lang="de-DE"/>
               <a:t>Vierte Ebene</a:t>
             </a:r>
           </a:p>
           <a:p>
             <a:pPr lvl="4"/>
             <a:r>
-              <a:rPr lang="de-DE" smtClean="0"/>
+              <a:rPr lang="de-DE"/>
               <a:t>Fünfte Ebene</a:t>
             </a:r>
-            <a:endParaRPr lang="de-DE"/>
           </a:p>
         </p:txBody>
       </p:sp>
@@ -462,7 +480,7 @@
           <a:p>
             <a:fld id="{8D1E506D-564B-415C-99DD-7751041BB7A0}" type="datetimeFigureOut">
               <a:rPr lang="de-DE" smtClean="0"/>
-              <a:t>21.09.2025</a:t>
+              <a:t>28.09.2025</a:t>
             </a:fld>
             <a:endParaRPr lang="de-DE"/>
           </a:p>
@@ -561,10 +579,9 @@
           <a:lstStyle/>
           <a:p>
             <a:r>
-              <a:rPr lang="de-DE" smtClean="0"/>
+              <a:rPr lang="de-DE"/>
               <a:t>Titelmasterformat durch Klicken bearbeiten</a:t>
             </a:r>
-            <a:endParaRPr lang="de-DE"/>
           </a:p>
         </p:txBody>
       </p:sp>
@@ -590,38 +607,37 @@
           <a:p>
             <a:pPr lvl="0"/>
             <a:r>
-              <a:rPr lang="de-DE" smtClean="0"/>
+              <a:rPr lang="de-DE"/>
               <a:t>Textmasterformat bearbeiten</a:t>
             </a:r>
           </a:p>
           <a:p>
             <a:pPr lvl="1"/>
             <a:r>
-              <a:rPr lang="de-DE" smtClean="0"/>
+              <a:rPr lang="de-DE"/>
               <a:t>Zweite Ebene</a:t>
             </a:r>
           </a:p>
           <a:p>
             <a:pPr lvl="2"/>
             <a:r>
-              <a:rPr lang="de-DE" smtClean="0"/>
+              <a:rPr lang="de-DE"/>
               <a:t>Dritte Ebene</a:t>
             </a:r>
           </a:p>
           <a:p>
             <a:pPr lvl="3"/>
             <a:r>
-              <a:rPr lang="de-DE" smtClean="0"/>
+              <a:rPr lang="de-DE"/>
               <a:t>Vierte Ebene</a:t>
             </a:r>
           </a:p>
           <a:p>
             <a:pPr lvl="4"/>
             <a:r>
-              <a:rPr lang="de-DE" smtClean="0"/>
+              <a:rPr lang="de-DE"/>
               <a:t>Fünfte Ebene</a:t>
             </a:r>
-            <a:endParaRPr lang="de-DE"/>
           </a:p>
         </p:txBody>
       </p:sp>
@@ -642,7 +658,7 @@
           <a:p>
             <a:fld id="{8D1E506D-564B-415C-99DD-7751041BB7A0}" type="datetimeFigureOut">
               <a:rPr lang="de-DE" smtClean="0"/>
-              <a:t>21.09.2025</a:t>
+              <a:t>28.09.2025</a:t>
             </a:fld>
             <a:endParaRPr lang="de-DE"/>
           </a:p>
@@ -736,10 +752,9 @@
           <a:lstStyle/>
           <a:p>
             <a:r>
-              <a:rPr lang="de-DE" smtClean="0"/>
+              <a:rPr lang="de-DE"/>
               <a:t>Titelmasterformat durch Klicken bearbeiten</a:t>
             </a:r>
-            <a:endParaRPr lang="de-DE"/>
           </a:p>
         </p:txBody>
       </p:sp>
@@ -760,38 +775,37 @@
           <a:p>
             <a:pPr lvl="0"/>
             <a:r>
-              <a:rPr lang="de-DE" smtClean="0"/>
+              <a:rPr lang="de-DE"/>
               <a:t>Textmasterformat bearbeiten</a:t>
             </a:r>
           </a:p>
           <a:p>
             <a:pPr lvl="1"/>
             <a:r>
-              <a:rPr lang="de-DE" smtClean="0"/>
+              <a:rPr lang="de-DE"/>
               <a:t>Zweite Ebene</a:t>
             </a:r>
           </a:p>
           <a:p>
             <a:pPr lvl="2"/>
             <a:r>
-              <a:rPr lang="de-DE" smtClean="0"/>
+              <a:rPr lang="de-DE"/>
               <a:t>Dritte Ebene</a:t>
             </a:r>
           </a:p>
           <a:p>
             <a:pPr lvl="3"/>
             <a:r>
-              <a:rPr lang="de-DE" smtClean="0"/>
+              <a:rPr lang="de-DE"/>
               <a:t>Vierte Ebene</a:t>
             </a:r>
           </a:p>
           <a:p>
             <a:pPr lvl="4"/>
             <a:r>
-              <a:rPr lang="de-DE" smtClean="0"/>
+              <a:rPr lang="de-DE"/>
               <a:t>Fünfte Ebene</a:t>
             </a:r>
-            <a:endParaRPr lang="de-DE"/>
           </a:p>
         </p:txBody>
       </p:sp>
@@ -812,7 +826,7 @@
           <a:p>
             <a:fld id="{8D1E506D-564B-415C-99DD-7751041BB7A0}" type="datetimeFigureOut">
               <a:rPr lang="de-DE" smtClean="0"/>
-              <a:t>21.09.2025</a:t>
+              <a:t>28.09.2025</a:t>
             </a:fld>
             <a:endParaRPr lang="de-DE"/>
           </a:p>
@@ -915,10 +929,9 @@
           </a:lstStyle>
           <a:p>
             <a:r>
-              <a:rPr lang="de-DE" smtClean="0"/>
+              <a:rPr lang="de-DE"/>
               <a:t>Titelmasterformat durch Klicken bearbeiten</a:t>
             </a:r>
-            <a:endParaRPr lang="de-DE"/>
           </a:p>
         </p:txBody>
       </p:sp>
@@ -1035,7 +1048,7 @@
           <a:p>
             <a:pPr lvl="0"/>
             <a:r>
-              <a:rPr lang="de-DE" smtClean="0"/>
+              <a:rPr lang="de-DE"/>
               <a:t>Textmasterformat bearbeiten</a:t>
             </a:r>
           </a:p>
@@ -1058,7 +1071,7 @@
           <a:p>
             <a:fld id="{8D1E506D-564B-415C-99DD-7751041BB7A0}" type="datetimeFigureOut">
               <a:rPr lang="de-DE" smtClean="0"/>
-              <a:t>21.09.2025</a:t>
+              <a:t>28.09.2025</a:t>
             </a:fld>
             <a:endParaRPr lang="de-DE"/>
           </a:p>
@@ -1152,10 +1165,9 @@
           <a:lstStyle/>
           <a:p>
             <a:r>
-              <a:rPr lang="de-DE" smtClean="0"/>
+              <a:rPr lang="de-DE"/>
               <a:t>Titelmasterformat durch Klicken bearbeiten</a:t>
             </a:r>
-            <a:endParaRPr lang="de-DE"/>
           </a:p>
         </p:txBody>
       </p:sp>
@@ -1209,38 +1221,37 @@
           <a:p>
             <a:pPr lvl="0"/>
             <a:r>
-              <a:rPr lang="de-DE" smtClean="0"/>
+              <a:rPr lang="de-DE"/>
               <a:t>Textmasterformat bearbeiten</a:t>
             </a:r>
           </a:p>
           <a:p>
             <a:pPr lvl="1"/>
             <a:r>
-              <a:rPr lang="de-DE" smtClean="0"/>
+              <a:rPr lang="de-DE"/>
               <a:t>Zweite Ebene</a:t>
             </a:r>
           </a:p>
           <a:p>
             <a:pPr lvl="2"/>
             <a:r>
-              <a:rPr lang="de-DE" smtClean="0"/>
+              <a:rPr lang="de-DE"/>
               <a:t>Dritte Ebene</a:t>
             </a:r>
           </a:p>
           <a:p>
             <a:pPr lvl="3"/>
             <a:r>
-              <a:rPr lang="de-DE" smtClean="0"/>
+              <a:rPr lang="de-DE"/>
               <a:t>Vierte Ebene</a:t>
             </a:r>
           </a:p>
           <a:p>
             <a:pPr lvl="4"/>
             <a:r>
-              <a:rPr lang="de-DE" smtClean="0"/>
+              <a:rPr lang="de-DE"/>
               <a:t>Fünfte Ebene</a:t>
             </a:r>
-            <a:endParaRPr lang="de-DE"/>
           </a:p>
         </p:txBody>
       </p:sp>
@@ -1294,38 +1305,37 @@
           <a:p>
             <a:pPr lvl="0"/>
             <a:r>
-              <a:rPr lang="de-DE" smtClean="0"/>
+              <a:rPr lang="de-DE"/>
               <a:t>Textmasterformat bearbeiten</a:t>
             </a:r>
           </a:p>
           <a:p>
             <a:pPr lvl="1"/>
             <a:r>
-              <a:rPr lang="de-DE" smtClean="0"/>
+              <a:rPr lang="de-DE"/>
               <a:t>Zweite Ebene</a:t>
             </a:r>
           </a:p>
           <a:p>
             <a:pPr lvl="2"/>
             <a:r>
-              <a:rPr lang="de-DE" smtClean="0"/>
+              <a:rPr lang="de-DE"/>
               <a:t>Dritte Ebene</a:t>
             </a:r>
           </a:p>
           <a:p>
             <a:pPr lvl="3"/>
             <a:r>
-              <a:rPr lang="de-DE" smtClean="0"/>
+              <a:rPr lang="de-DE"/>
               <a:t>Vierte Ebene</a:t>
             </a:r>
           </a:p>
           <a:p>
             <a:pPr lvl="4"/>
             <a:r>
-              <a:rPr lang="de-DE" smtClean="0"/>
+              <a:rPr lang="de-DE"/>
               <a:t>Fünfte Ebene</a:t>
             </a:r>
-            <a:endParaRPr lang="de-DE"/>
           </a:p>
         </p:txBody>
       </p:sp>
@@ -1346,7 +1356,7 @@
           <a:p>
             <a:fld id="{8D1E506D-564B-415C-99DD-7751041BB7A0}" type="datetimeFigureOut">
               <a:rPr lang="de-DE" smtClean="0"/>
-              <a:t>21.09.2025</a:t>
+              <a:t>28.09.2025</a:t>
             </a:fld>
             <a:endParaRPr lang="de-DE"/>
           </a:p>
@@ -1444,10 +1454,9 @@
           </a:lstStyle>
           <a:p>
             <a:r>
-              <a:rPr lang="de-DE" smtClean="0"/>
+              <a:rPr lang="de-DE"/>
               <a:t>Titelmasterformat durch Klicken bearbeiten</a:t>
             </a:r>
-            <a:endParaRPr lang="de-DE"/>
           </a:p>
         </p:txBody>
       </p:sp>
@@ -1510,7 +1519,7 @@
           <a:p>
             <a:pPr lvl="0"/>
             <a:r>
-              <a:rPr lang="de-DE" smtClean="0"/>
+              <a:rPr lang="de-DE"/>
               <a:t>Textmasterformat bearbeiten</a:t>
             </a:r>
           </a:p>
@@ -1566,38 +1575,37 @@
           <a:p>
             <a:pPr lvl="0"/>
             <a:r>
-              <a:rPr lang="de-DE" smtClean="0"/>
+              <a:rPr lang="de-DE"/>
               <a:t>Textmasterformat bearbeiten</a:t>
             </a:r>
           </a:p>
           <a:p>
             <a:pPr lvl="1"/>
             <a:r>
-              <a:rPr lang="de-DE" smtClean="0"/>
+              <a:rPr lang="de-DE"/>
               <a:t>Zweite Ebene</a:t>
             </a:r>
           </a:p>
           <a:p>
             <a:pPr lvl="2"/>
             <a:r>
-              <a:rPr lang="de-DE" smtClean="0"/>
+              <a:rPr lang="de-DE"/>
               <a:t>Dritte Ebene</a:t>
             </a:r>
           </a:p>
           <a:p>
             <a:pPr lvl="3"/>
             <a:r>
-              <a:rPr lang="de-DE" smtClean="0"/>
+              <a:rPr lang="de-DE"/>
               <a:t>Vierte Ebene</a:t>
             </a:r>
           </a:p>
           <a:p>
             <a:pPr lvl="4"/>
             <a:r>
-              <a:rPr lang="de-DE" smtClean="0"/>
+              <a:rPr lang="de-DE"/>
               <a:t>Fünfte Ebene</a:t>
             </a:r>
-            <a:endParaRPr lang="de-DE"/>
           </a:p>
         </p:txBody>
       </p:sp>
@@ -1660,7 +1668,7 @@
           <a:p>
             <a:pPr lvl="0"/>
             <a:r>
-              <a:rPr lang="de-DE" smtClean="0"/>
+              <a:rPr lang="de-DE"/>
               <a:t>Textmasterformat bearbeiten</a:t>
             </a:r>
           </a:p>
@@ -1716,38 +1724,37 @@
           <a:p>
             <a:pPr lvl="0"/>
             <a:r>
-              <a:rPr lang="de-DE" smtClean="0"/>
+              <a:rPr lang="de-DE"/>
               <a:t>Textmasterformat bearbeiten</a:t>
             </a:r>
           </a:p>
           <a:p>
             <a:pPr lvl="1"/>
             <a:r>
-              <a:rPr lang="de-DE" smtClean="0"/>
+              <a:rPr lang="de-DE"/>
               <a:t>Zweite Ebene</a:t>
             </a:r>
           </a:p>
           <a:p>
             <a:pPr lvl="2"/>
             <a:r>
-              <a:rPr lang="de-DE" smtClean="0"/>
+              <a:rPr lang="de-DE"/>
               <a:t>Dritte Ebene</a:t>
             </a:r>
           </a:p>
           <a:p>
             <a:pPr lvl="3"/>
             <a:r>
-              <a:rPr lang="de-DE" smtClean="0"/>
+              <a:rPr lang="de-DE"/>
               <a:t>Vierte Ebene</a:t>
             </a:r>
           </a:p>
           <a:p>
             <a:pPr lvl="4"/>
             <a:r>
-              <a:rPr lang="de-DE" smtClean="0"/>
+              <a:rPr lang="de-DE"/>
               <a:t>Fünfte Ebene</a:t>
             </a:r>
-            <a:endParaRPr lang="de-DE"/>
           </a:p>
         </p:txBody>
       </p:sp>
@@ -1768,7 +1775,7 @@
           <a:p>
             <a:fld id="{8D1E506D-564B-415C-99DD-7751041BB7A0}" type="datetimeFigureOut">
               <a:rPr lang="de-DE" smtClean="0"/>
-              <a:t>21.09.2025</a:t>
+              <a:t>28.09.2025</a:t>
             </a:fld>
             <a:endParaRPr lang="de-DE"/>
           </a:p>
@@ -1862,10 +1869,9 @@
           <a:lstStyle/>
           <a:p>
             <a:r>
-              <a:rPr lang="de-DE" smtClean="0"/>
+              <a:rPr lang="de-DE"/>
               <a:t>Titelmasterformat durch Klicken bearbeiten</a:t>
             </a:r>
-            <a:endParaRPr lang="de-DE"/>
           </a:p>
         </p:txBody>
       </p:sp>
@@ -1886,7 +1892,7 @@
           <a:p>
             <a:fld id="{8D1E506D-564B-415C-99DD-7751041BB7A0}" type="datetimeFigureOut">
               <a:rPr lang="de-DE" smtClean="0"/>
-              <a:t>21.09.2025</a:t>
+              <a:t>28.09.2025</a:t>
             </a:fld>
             <a:endParaRPr lang="de-DE"/>
           </a:p>
@@ -1981,7 +1987,7 @@
           <a:p>
             <a:fld id="{8D1E506D-564B-415C-99DD-7751041BB7A0}" type="datetimeFigureOut">
               <a:rPr lang="de-DE" smtClean="0"/>
-              <a:t>21.09.2025</a:t>
+              <a:t>28.09.2025</a:t>
             </a:fld>
             <a:endParaRPr lang="de-DE"/>
           </a:p>
@@ -2084,10 +2090,9 @@
           </a:lstStyle>
           <a:p>
             <a:r>
-              <a:rPr lang="de-DE" smtClean="0"/>
+              <a:rPr lang="de-DE"/>
               <a:t>Titelmasterformat durch Klicken bearbeiten</a:t>
             </a:r>
-            <a:endParaRPr lang="de-DE"/>
           </a:p>
         </p:txBody>
       </p:sp>
@@ -2141,38 +2146,37 @@
           <a:p>
             <a:pPr lvl="0"/>
             <a:r>
-              <a:rPr lang="de-DE" smtClean="0"/>
+              <a:rPr lang="de-DE"/>
               <a:t>Textmasterformat bearbeiten</a:t>
             </a:r>
           </a:p>
           <a:p>
             <a:pPr lvl="1"/>
             <a:r>
-              <a:rPr lang="de-DE" smtClean="0"/>
+              <a:rPr lang="de-DE"/>
               <a:t>Zweite Ebene</a:t>
             </a:r>
           </a:p>
           <a:p>
             <a:pPr lvl="2"/>
             <a:r>
-              <a:rPr lang="de-DE" smtClean="0"/>
+              <a:rPr lang="de-DE"/>
               <a:t>Dritte Ebene</a:t>
             </a:r>
           </a:p>
           <a:p>
             <a:pPr lvl="3"/>
             <a:r>
-              <a:rPr lang="de-DE" smtClean="0"/>
+              <a:rPr lang="de-DE"/>
               <a:t>Vierte Ebene</a:t>
             </a:r>
           </a:p>
           <a:p>
             <a:pPr lvl="4"/>
             <a:r>
-              <a:rPr lang="de-DE" smtClean="0"/>
+              <a:rPr lang="de-DE"/>
               <a:t>Fünfte Ebene</a:t>
             </a:r>
-            <a:endParaRPr lang="de-DE"/>
           </a:p>
         </p:txBody>
       </p:sp>
@@ -2235,7 +2239,7 @@
           <a:p>
             <a:pPr lvl="0"/>
             <a:r>
-              <a:rPr lang="de-DE" smtClean="0"/>
+              <a:rPr lang="de-DE"/>
               <a:t>Textmasterformat bearbeiten</a:t>
             </a:r>
           </a:p>
@@ -2258,7 +2262,7 @@
           <a:p>
             <a:fld id="{8D1E506D-564B-415C-99DD-7751041BB7A0}" type="datetimeFigureOut">
               <a:rPr lang="de-DE" smtClean="0"/>
-              <a:t>21.09.2025</a:t>
+              <a:t>28.09.2025</a:t>
             </a:fld>
             <a:endParaRPr lang="de-DE"/>
           </a:p>
@@ -2361,10 +2365,9 @@
           </a:lstStyle>
           <a:p>
             <a:r>
-              <a:rPr lang="de-DE" smtClean="0"/>
+              <a:rPr lang="de-DE"/>
               <a:t>Titelmasterformat durch Klicken bearbeiten</a:t>
             </a:r>
-            <a:endParaRPr lang="de-DE"/>
           </a:p>
         </p:txBody>
       </p:sp>
@@ -2488,7 +2491,7 @@
           <a:p>
             <a:pPr lvl="0"/>
             <a:r>
-              <a:rPr lang="de-DE" smtClean="0"/>
+              <a:rPr lang="de-DE"/>
               <a:t>Textmasterformat bearbeiten</a:t>
             </a:r>
           </a:p>
@@ -2511,7 +2514,7 @@
           <a:p>
             <a:fld id="{8D1E506D-564B-415C-99DD-7751041BB7A0}" type="datetimeFigureOut">
               <a:rPr lang="de-DE" smtClean="0"/>
-              <a:t>21.09.2025</a:t>
+              <a:t>28.09.2025</a:t>
             </a:fld>
             <a:endParaRPr lang="de-DE"/>
           </a:p>
@@ -2620,10 +2623,9 @@
           <a:lstStyle/>
           <a:p>
             <a:r>
-              <a:rPr lang="de-DE" smtClean="0"/>
+              <a:rPr lang="de-DE"/>
               <a:t>Titelmasterformat durch Klicken bearbeiten</a:t>
             </a:r>
-            <a:endParaRPr lang="de-DE"/>
           </a:p>
         </p:txBody>
       </p:sp>
@@ -2654,38 +2656,37 @@
           <a:p>
             <a:pPr lvl="0"/>
             <a:r>
-              <a:rPr lang="de-DE" smtClean="0"/>
+              <a:rPr lang="de-DE"/>
               <a:t>Textmasterformat bearbeiten</a:t>
             </a:r>
           </a:p>
           <a:p>
             <a:pPr lvl="1"/>
             <a:r>
-              <a:rPr lang="de-DE" smtClean="0"/>
+              <a:rPr lang="de-DE"/>
               <a:t>Zweite Ebene</a:t>
             </a:r>
           </a:p>
           <a:p>
             <a:pPr lvl="2"/>
             <a:r>
-              <a:rPr lang="de-DE" smtClean="0"/>
+              <a:rPr lang="de-DE"/>
               <a:t>Dritte Ebene</a:t>
             </a:r>
           </a:p>
           <a:p>
             <a:pPr lvl="3"/>
             <a:r>
-              <a:rPr lang="de-DE" smtClean="0"/>
+              <a:rPr lang="de-DE"/>
               <a:t>Vierte Ebene</a:t>
             </a:r>
           </a:p>
           <a:p>
             <a:pPr lvl="4"/>
             <a:r>
-              <a:rPr lang="de-DE" smtClean="0"/>
+              <a:rPr lang="de-DE"/>
               <a:t>Fünfte Ebene</a:t>
             </a:r>
-            <a:endParaRPr lang="de-DE"/>
           </a:p>
         </p:txBody>
       </p:sp>
@@ -2724,7 +2725,7 @@
           <a:p>
             <a:fld id="{8D1E506D-564B-415C-99DD-7751041BB7A0}" type="datetimeFigureOut">
               <a:rPr lang="de-DE" smtClean="0"/>
-              <a:t>21.09.2025</a:t>
+              <a:t>28.09.2025</a:t>
             </a:fld>
             <a:endParaRPr lang="de-DE"/>
           </a:p>
@@ -3099,47 +3100,401 @@
           <a:chExt cx="0" cy="0"/>
         </a:xfrm>
       </p:grpSpPr>
-      <p:pic>
-        <p:nvPicPr>
-          <p:cNvPr id="1026" name="Picture 2" descr="E:\Projekte\Coding\Controller\GUI_files\resources\crosshair.png"/>
-          <p:cNvPicPr>
-            <a:picLocks noChangeAspect="1" noChangeArrowheads="1"/>
-          </p:cNvPicPr>
-          <p:nvPr/>
-        </p:nvPicPr>
-        <p:blipFill>
-          <a:blip r:embed="rId2">
+      <p:sp>
+        <p:nvSpPr>
+          <p:cNvPr id="15" name="Rechteck 14">
             <a:extLst>
-              <a:ext uri="{28A0092B-C50C-407E-A947-70E740481C1C}">
-                <a14:useLocalDpi xmlns:a14="http://schemas.microsoft.com/office/drawing/2010/main" val="0"/>
+              <a:ext uri="{FF2B5EF4-FFF2-40B4-BE49-F238E27FC236}">
+                <a16:creationId xmlns:a16="http://schemas.microsoft.com/office/drawing/2014/main" id="{A41BF973-B26C-E720-F598-7E4E53F9DD71}"/>
               </a:ext>
             </a:extLst>
-          </a:blip>
-          <a:srcRect/>
-          <a:stretch>
-            <a:fillRect/>
-          </a:stretch>
-        </p:blipFill>
-        <p:spPr bwMode="auto">
+          </p:cNvPr>
+          <p:cNvSpPr/>
+          <p:nvPr/>
+        </p:nvSpPr>
+        <p:spPr>
           <a:xfrm>
-            <a:off x="2331428" y="2649442"/>
-            <a:ext cx="4054223" cy="4054223"/>
+            <a:off x="-1414884" y="-1035496"/>
+            <a:ext cx="10801200" cy="8136904"/>
           </a:xfrm>
           <a:prstGeom prst="rect">
             <a:avLst/>
           </a:prstGeom>
-          <a:noFill/>
-          <a:extLst>
-            <a:ext uri="{909E8E84-426E-40DD-AFC4-6F175D3DCCD1}">
-              <a14:hiddenFill xmlns:a14="http://schemas.microsoft.com/office/drawing/2010/main">
-                <a:solidFill>
-                  <a:srgbClr val="FFFFFF"/>
-                </a:solidFill>
-              </a14:hiddenFill>
-            </a:ext>
-          </a:extLst>
         </p:spPr>
-      </p:pic>
+        <p:style>
+          <a:lnRef idx="2">
+            <a:schemeClr val="accent1">
+              <a:shade val="15000"/>
+            </a:schemeClr>
+          </a:lnRef>
+          <a:fillRef idx="1">
+            <a:schemeClr val="accent1"/>
+          </a:fillRef>
+          <a:effectRef idx="0">
+            <a:schemeClr val="accent1"/>
+          </a:effectRef>
+          <a:fontRef idx="minor">
+            <a:schemeClr val="lt1"/>
+          </a:fontRef>
+        </p:style>
+        <p:txBody>
+          <a:bodyPr rtlCol="0" anchor="ctr"/>
+          <a:lstStyle/>
+          <a:p>
+            <a:pPr algn="ctr"/>
+            <a:endParaRPr lang="de-DE"/>
+          </a:p>
+        </p:txBody>
+      </p:sp>
+      <p:grpSp>
+        <p:nvGrpSpPr>
+          <p:cNvPr id="14" name="Gruppieren 13">
+            <a:extLst>
+              <a:ext uri="{FF2B5EF4-FFF2-40B4-BE49-F238E27FC236}">
+                <a16:creationId xmlns:a16="http://schemas.microsoft.com/office/drawing/2014/main" id="{D8873501-EE57-3E7A-2710-A9ED0ABB7A2C}"/>
+              </a:ext>
+            </a:extLst>
+          </p:cNvPr>
+          <p:cNvGrpSpPr/>
+          <p:nvPr/>
+        </p:nvGrpSpPr>
+        <p:grpSpPr>
+          <a:xfrm>
+            <a:off x="2051720" y="2348880"/>
+            <a:ext cx="4680000" cy="4680000"/>
+            <a:chOff x="2483447" y="2725714"/>
+            <a:chExt cx="3790353" cy="3869401"/>
+          </a:xfrm>
+        </p:grpSpPr>
+        <p:sp>
+          <p:nvSpPr>
+            <p:cNvPr id="4" name="Ellipse 3">
+              <a:extLst>
+                <a:ext uri="{FF2B5EF4-FFF2-40B4-BE49-F238E27FC236}">
+                  <a16:creationId xmlns:a16="http://schemas.microsoft.com/office/drawing/2014/main" id="{EF785884-FB53-C5CB-BED3-A3F54D4FDBED}"/>
+                </a:ext>
+              </a:extLst>
+            </p:cNvPr>
+            <p:cNvSpPr/>
+            <p:nvPr/>
+          </p:nvSpPr>
+          <p:spPr>
+            <a:xfrm>
+              <a:off x="2738539" y="3056553"/>
+              <a:ext cx="3240000" cy="3240000"/>
+            </a:xfrm>
+            <a:prstGeom prst="ellipse">
+              <a:avLst/>
+            </a:prstGeom>
+            <a:noFill/>
+            <a:ln w="174625">
+              <a:solidFill>
+                <a:srgbClr val="E6E6E6"/>
+              </a:solidFill>
+            </a:ln>
+          </p:spPr>
+          <p:style>
+            <a:lnRef idx="2">
+              <a:schemeClr val="accent1">
+                <a:shade val="15000"/>
+              </a:schemeClr>
+            </a:lnRef>
+            <a:fillRef idx="1">
+              <a:schemeClr val="accent1"/>
+            </a:fillRef>
+            <a:effectRef idx="0">
+              <a:schemeClr val="accent1"/>
+            </a:effectRef>
+            <a:fontRef idx="minor">
+              <a:schemeClr val="lt1"/>
+            </a:fontRef>
+          </p:style>
+          <p:txBody>
+            <a:bodyPr rtlCol="0" anchor="ctr"/>
+            <a:lstStyle/>
+            <a:p>
+              <a:pPr algn="ctr"/>
+              <a:endParaRPr lang="de-DE"/>
+            </a:p>
+          </p:txBody>
+        </p:sp>
+        <p:sp>
+          <p:nvSpPr>
+            <p:cNvPr id="5" name="Ellipse 4">
+              <a:extLst>
+                <a:ext uri="{FF2B5EF4-FFF2-40B4-BE49-F238E27FC236}">
+                  <a16:creationId xmlns:a16="http://schemas.microsoft.com/office/drawing/2014/main" id="{2A7F9436-D9EB-4526-1E17-EF9F24D7BFFA}"/>
+                </a:ext>
+              </a:extLst>
+            </p:cNvPr>
+            <p:cNvSpPr/>
+            <p:nvPr/>
+          </p:nvSpPr>
+          <p:spPr>
+            <a:xfrm>
+              <a:off x="3278539" y="3597624"/>
+              <a:ext cx="2160000" cy="2160000"/>
+            </a:xfrm>
+            <a:prstGeom prst="ellipse">
+              <a:avLst/>
+            </a:prstGeom>
+            <a:noFill/>
+            <a:ln w="174625">
+              <a:solidFill>
+                <a:srgbClr val="E6E6E6"/>
+              </a:solidFill>
+            </a:ln>
+          </p:spPr>
+          <p:style>
+            <a:lnRef idx="2">
+              <a:schemeClr val="accent1">
+                <a:shade val="15000"/>
+              </a:schemeClr>
+            </a:lnRef>
+            <a:fillRef idx="1">
+              <a:schemeClr val="accent1"/>
+            </a:fillRef>
+            <a:effectRef idx="0">
+              <a:schemeClr val="accent1"/>
+            </a:effectRef>
+            <a:fontRef idx="minor">
+              <a:schemeClr val="lt1"/>
+            </a:fontRef>
+          </p:style>
+          <p:txBody>
+            <a:bodyPr rtlCol="0" anchor="ctr"/>
+            <a:lstStyle/>
+            <a:p>
+              <a:pPr algn="ctr"/>
+              <a:endParaRPr lang="de-DE"/>
+            </a:p>
+          </p:txBody>
+        </p:sp>
+        <p:sp>
+          <p:nvSpPr>
+            <p:cNvPr id="7" name="Ellipse 6">
+              <a:extLst>
+                <a:ext uri="{FF2B5EF4-FFF2-40B4-BE49-F238E27FC236}">
+                  <a16:creationId xmlns:a16="http://schemas.microsoft.com/office/drawing/2014/main" id="{2CDE11E8-559B-61F9-B6DE-EA2992F0A69F}"/>
+                </a:ext>
+              </a:extLst>
+            </p:cNvPr>
+            <p:cNvSpPr/>
+            <p:nvPr/>
+          </p:nvSpPr>
+          <p:spPr>
+            <a:xfrm>
+              <a:off x="4178539" y="4496553"/>
+              <a:ext cx="360000" cy="360000"/>
+            </a:xfrm>
+            <a:prstGeom prst="ellipse">
+              <a:avLst/>
+            </a:prstGeom>
+            <a:noFill/>
+            <a:ln w="174625">
+              <a:solidFill>
+                <a:srgbClr val="E6E6E6"/>
+              </a:solidFill>
+            </a:ln>
+          </p:spPr>
+          <p:style>
+            <a:lnRef idx="2">
+              <a:schemeClr val="accent1">
+                <a:shade val="15000"/>
+              </a:schemeClr>
+            </a:lnRef>
+            <a:fillRef idx="1">
+              <a:schemeClr val="accent1"/>
+            </a:fillRef>
+            <a:effectRef idx="0">
+              <a:schemeClr val="accent1"/>
+            </a:effectRef>
+            <a:fontRef idx="minor">
+              <a:schemeClr val="lt1"/>
+            </a:fontRef>
+          </p:style>
+          <p:txBody>
+            <a:bodyPr rtlCol="0" anchor="ctr"/>
+            <a:lstStyle/>
+            <a:p>
+              <a:pPr algn="ctr"/>
+              <a:endParaRPr lang="de-DE"/>
+            </a:p>
+          </p:txBody>
+        </p:sp>
+        <p:cxnSp>
+          <p:nvCxnSpPr>
+            <p:cNvPr id="9" name="Gerader Verbinder 8">
+              <a:extLst>
+                <a:ext uri="{FF2B5EF4-FFF2-40B4-BE49-F238E27FC236}">
+                  <a16:creationId xmlns:a16="http://schemas.microsoft.com/office/drawing/2014/main" id="{9F78F54A-51B1-58B6-0B24-9E9D29CA6868}"/>
+                </a:ext>
+              </a:extLst>
+            </p:cNvPr>
+            <p:cNvCxnSpPr>
+              <a:cxnSpLocks/>
+            </p:cNvCxnSpPr>
+            <p:nvPr/>
+          </p:nvCxnSpPr>
+          <p:spPr>
+            <a:xfrm>
+              <a:off x="5137747" y="4689253"/>
+              <a:ext cx="1136053" cy="0"/>
+            </a:xfrm>
+            <a:prstGeom prst="line">
+              <a:avLst/>
+            </a:prstGeom>
+            <a:ln w="174625" cap="rnd">
+              <a:solidFill>
+                <a:srgbClr val="E6E6E6"/>
+              </a:solidFill>
+            </a:ln>
+          </p:spPr>
+          <p:style>
+            <a:lnRef idx="1">
+              <a:schemeClr val="accent1"/>
+            </a:lnRef>
+            <a:fillRef idx="0">
+              <a:schemeClr val="accent1"/>
+            </a:fillRef>
+            <a:effectRef idx="0">
+              <a:schemeClr val="accent1"/>
+            </a:effectRef>
+            <a:fontRef idx="minor">
+              <a:schemeClr val="tx1"/>
+            </a:fontRef>
+          </p:style>
+        </p:cxnSp>
+        <p:cxnSp>
+          <p:nvCxnSpPr>
+            <p:cNvPr id="11" name="Gerader Verbinder 10">
+              <a:extLst>
+                <a:ext uri="{FF2B5EF4-FFF2-40B4-BE49-F238E27FC236}">
+                  <a16:creationId xmlns:a16="http://schemas.microsoft.com/office/drawing/2014/main" id="{FD562AFA-5F5D-8361-080F-1DE0A52F84D4}"/>
+                </a:ext>
+              </a:extLst>
+            </p:cNvPr>
+            <p:cNvCxnSpPr>
+              <a:cxnSpLocks/>
+            </p:cNvCxnSpPr>
+            <p:nvPr/>
+          </p:nvCxnSpPr>
+          <p:spPr>
+            <a:xfrm>
+              <a:off x="2483447" y="4689253"/>
+              <a:ext cx="1136053" cy="0"/>
+            </a:xfrm>
+            <a:prstGeom prst="line">
+              <a:avLst/>
+            </a:prstGeom>
+            <a:ln w="174625" cap="rnd">
+              <a:solidFill>
+                <a:srgbClr val="E6E6E6"/>
+              </a:solidFill>
+            </a:ln>
+          </p:spPr>
+          <p:style>
+            <a:lnRef idx="1">
+              <a:schemeClr val="accent1"/>
+            </a:lnRef>
+            <a:fillRef idx="0">
+              <a:schemeClr val="accent1"/>
+            </a:fillRef>
+            <a:effectRef idx="0">
+              <a:schemeClr val="accent1"/>
+            </a:effectRef>
+            <a:fontRef idx="minor">
+              <a:schemeClr val="tx1"/>
+            </a:fontRef>
+          </p:style>
+        </p:cxnSp>
+        <p:cxnSp>
+          <p:nvCxnSpPr>
+            <p:cNvPr id="12" name="Gerader Verbinder 11">
+              <a:extLst>
+                <a:ext uri="{FF2B5EF4-FFF2-40B4-BE49-F238E27FC236}">
+                  <a16:creationId xmlns:a16="http://schemas.microsoft.com/office/drawing/2014/main" id="{868E9128-A416-241A-DC3F-A3C0F06A5535}"/>
+                </a:ext>
+              </a:extLst>
+            </p:cNvPr>
+            <p:cNvCxnSpPr>
+              <a:cxnSpLocks/>
+            </p:cNvCxnSpPr>
+            <p:nvPr/>
+          </p:nvCxnSpPr>
+          <p:spPr>
+            <a:xfrm rot="5400000">
+              <a:off x="3800773" y="3293741"/>
+              <a:ext cx="1136053" cy="0"/>
+            </a:xfrm>
+            <a:prstGeom prst="line">
+              <a:avLst/>
+            </a:prstGeom>
+            <a:ln w="174625" cap="rnd">
+              <a:solidFill>
+                <a:srgbClr val="E6E6E6"/>
+              </a:solidFill>
+            </a:ln>
+          </p:spPr>
+          <p:style>
+            <a:lnRef idx="1">
+              <a:schemeClr val="accent1"/>
+            </a:lnRef>
+            <a:fillRef idx="0">
+              <a:schemeClr val="accent1"/>
+            </a:fillRef>
+            <a:effectRef idx="0">
+              <a:schemeClr val="accent1"/>
+            </a:effectRef>
+            <a:fontRef idx="minor">
+              <a:schemeClr val="tx1"/>
+            </a:fontRef>
+          </p:style>
+        </p:cxnSp>
+        <p:cxnSp>
+          <p:nvCxnSpPr>
+            <p:cNvPr id="13" name="Gerader Verbinder 12">
+              <a:extLst>
+                <a:ext uri="{FF2B5EF4-FFF2-40B4-BE49-F238E27FC236}">
+                  <a16:creationId xmlns:a16="http://schemas.microsoft.com/office/drawing/2014/main" id="{2A8246B4-FDFE-7807-D6D5-D207BC3040F3}"/>
+                </a:ext>
+              </a:extLst>
+            </p:cNvPr>
+            <p:cNvCxnSpPr>
+              <a:cxnSpLocks/>
+            </p:cNvCxnSpPr>
+            <p:nvPr/>
+          </p:nvCxnSpPr>
+          <p:spPr>
+            <a:xfrm rot="5400000">
+              <a:off x="3800773" y="6027089"/>
+              <a:ext cx="1136053" cy="0"/>
+            </a:xfrm>
+            <a:prstGeom prst="line">
+              <a:avLst/>
+            </a:prstGeom>
+            <a:ln w="174625" cap="rnd">
+              <a:solidFill>
+                <a:srgbClr val="E6E6E6"/>
+              </a:solidFill>
+            </a:ln>
+          </p:spPr>
+          <p:style>
+            <a:lnRef idx="1">
+              <a:schemeClr val="accent1"/>
+            </a:lnRef>
+            <a:fillRef idx="0">
+              <a:schemeClr val="accent1"/>
+            </a:fillRef>
+            <a:effectRef idx="0">
+              <a:schemeClr val="accent1"/>
+            </a:effectRef>
+            <a:fontRef idx="minor">
+              <a:schemeClr val="tx1"/>
+            </a:fontRef>
+          </p:style>
+        </p:cxnSp>
+      </p:grpSp>
       <p:sp>
         <p:nvSpPr>
           <p:cNvPr id="6" name="Bogen 5"/>
@@ -3159,9 +3514,7 @@
           </a:prstGeom>
           <a:ln w="508000" cap="rnd">
             <a:solidFill>
-              <a:schemeClr val="accent6">
-                <a:lumMod val="75000"/>
-              </a:schemeClr>
+              <a:schemeClr val="bg1"/>
             </a:solidFill>
             <a:round/>
             <a:tailEnd type="triangle" w="lg" len="med"/>
@@ -3190,47 +3543,6 @@
           </a:p>
         </p:txBody>
       </p:sp>
-      <p:pic>
-        <p:nvPicPr>
-          <p:cNvPr id="1030" name="Picture 6" descr="Symbole &amp; Icons zum Thema &quot;Home&quot; | Canva"/>
-          <p:cNvPicPr>
-            <a:picLocks noChangeAspect="1" noChangeArrowheads="1"/>
-          </p:cNvPicPr>
-          <p:nvPr/>
-        </p:nvPicPr>
-        <p:blipFill>
-          <a:blip r:embed="rId3" cstate="print">
-            <a:extLst>
-              <a:ext uri="{28A0092B-C50C-407E-A947-70E740481C1C}">
-                <a14:useLocalDpi xmlns:a14="http://schemas.microsoft.com/office/drawing/2010/main" val="0"/>
-              </a:ext>
-            </a:extLst>
-          </a:blip>
-          <a:srcRect/>
-          <a:stretch>
-            <a:fillRect/>
-          </a:stretch>
-        </p:blipFill>
-        <p:spPr bwMode="auto">
-          <a:xfrm>
-            <a:off x="4396477" y="4822900"/>
-            <a:ext cx="2187565" cy="2036425"/>
-          </a:xfrm>
-          <a:prstGeom prst="rect">
-            <a:avLst/>
-          </a:prstGeom>
-          <a:noFill/>
-          <a:extLst>
-            <a:ext uri="{909E8E84-426E-40DD-AFC4-6F175D3DCCD1}">
-              <a14:hiddenFill xmlns:a14="http://schemas.microsoft.com/office/drawing/2010/main">
-                <a:solidFill>
-                  <a:srgbClr val="FFFFFF"/>
-                </a:solidFill>
-              </a14:hiddenFill>
-            </a:ext>
-          </a:extLst>
-        </p:spPr>
-      </p:pic>
     </p:spTree>
     <p:extLst>
       <p:ext uri="{BB962C8B-B14F-4D97-AF65-F5344CB8AC3E}">
@@ -3241,13 +3553,220 @@
   <p:clrMapOvr>
     <a:masterClrMapping/>
   </p:clrMapOvr>
-  <p:timing>
-    <p:tnLst>
-      <p:par>
-        <p:cTn id="1" dur="indefinite" restart="never" nodeType="tmRoot"/>
-      </p:par>
-    </p:tnLst>
-  </p:timing>
+</p:sld>
+</file>
+
+<file path=ppt/slides/slide10.xml><?xml version="1.0" encoding="utf-8"?>
+<p:sld xmlns:a="http://schemas.openxmlformats.org/drawingml/2006/main" xmlns:r="http://schemas.openxmlformats.org/officeDocument/2006/relationships" xmlns:p="http://schemas.openxmlformats.org/presentationml/2006/main">
+  <p:cSld>
+    <p:spTree>
+      <p:nvGrpSpPr>
+        <p:cNvPr id="1" name="">
+          <a:extLst>
+            <a:ext uri="{FF2B5EF4-FFF2-40B4-BE49-F238E27FC236}">
+              <a16:creationId xmlns:a16="http://schemas.microsoft.com/office/drawing/2014/main" id="{9929270A-47DE-2992-A6F2-A9793696EF04}"/>
+            </a:ext>
+          </a:extLst>
+        </p:cNvPr>
+        <p:cNvGrpSpPr/>
+        <p:nvPr/>
+      </p:nvGrpSpPr>
+      <p:grpSpPr>
+        <a:xfrm>
+          <a:off x="0" y="0"/>
+          <a:ext cx="0" cy="0"/>
+          <a:chOff x="0" y="0"/>
+          <a:chExt cx="0" cy="0"/>
+        </a:xfrm>
+      </p:grpSpPr>
+      <p:sp>
+        <p:nvSpPr>
+          <p:cNvPr id="10" name="Rechteck 9">
+            <a:extLst>
+              <a:ext uri="{FF2B5EF4-FFF2-40B4-BE49-F238E27FC236}">
+                <a16:creationId xmlns:a16="http://schemas.microsoft.com/office/drawing/2014/main" id="{E5E79EF6-1C86-E4E6-2190-B7DD4B2E084C}"/>
+              </a:ext>
+            </a:extLst>
+          </p:cNvPr>
+          <p:cNvSpPr/>
+          <p:nvPr/>
+        </p:nvSpPr>
+        <p:spPr>
+          <a:xfrm>
+            <a:off x="-373619" y="-351966"/>
+            <a:ext cx="10801200" cy="8136904"/>
+          </a:xfrm>
+          <a:prstGeom prst="rect">
+            <a:avLst/>
+          </a:prstGeom>
+        </p:spPr>
+        <p:style>
+          <a:lnRef idx="2">
+            <a:schemeClr val="accent1">
+              <a:shade val="15000"/>
+            </a:schemeClr>
+          </a:lnRef>
+          <a:fillRef idx="1">
+            <a:schemeClr val="accent1"/>
+          </a:fillRef>
+          <a:effectRef idx="0">
+            <a:schemeClr val="accent1"/>
+          </a:effectRef>
+          <a:fontRef idx="minor">
+            <a:schemeClr val="lt1"/>
+          </a:fontRef>
+        </p:style>
+        <p:txBody>
+          <a:bodyPr rtlCol="0" anchor="ctr"/>
+          <a:lstStyle/>
+          <a:p>
+            <a:pPr algn="ctr"/>
+            <a:endParaRPr lang="de-DE"/>
+          </a:p>
+        </p:txBody>
+      </p:sp>
+      <p:sp>
+        <p:nvSpPr>
+          <p:cNvPr id="2" name="Rechteck 1">
+            <a:extLst>
+              <a:ext uri="{FF2B5EF4-FFF2-40B4-BE49-F238E27FC236}">
+                <a16:creationId xmlns:a16="http://schemas.microsoft.com/office/drawing/2014/main" id="{E1948EA3-297D-3F64-7B51-4374EE8E5C5D}"/>
+              </a:ext>
+            </a:extLst>
+          </p:cNvPr>
+          <p:cNvSpPr/>
+          <p:nvPr/>
+        </p:nvSpPr>
+        <p:spPr>
+          <a:xfrm>
+            <a:off x="3046981" y="1736486"/>
+            <a:ext cx="3960000" cy="3960000"/>
+          </a:xfrm>
+          <a:prstGeom prst="rect">
+            <a:avLst/>
+          </a:prstGeom>
+          <a:solidFill>
+            <a:schemeClr val="bg1"/>
+          </a:solidFill>
+          <a:ln>
+            <a:noFill/>
+          </a:ln>
+        </p:spPr>
+        <p:style>
+          <a:lnRef idx="2">
+            <a:schemeClr val="accent1">
+              <a:shade val="15000"/>
+            </a:schemeClr>
+          </a:lnRef>
+          <a:fillRef idx="1">
+            <a:schemeClr val="accent1"/>
+          </a:fillRef>
+          <a:effectRef idx="0">
+            <a:schemeClr val="accent1"/>
+          </a:effectRef>
+          <a:fontRef idx="minor">
+            <a:schemeClr val="lt1"/>
+          </a:fontRef>
+        </p:style>
+        <p:txBody>
+          <a:bodyPr rtlCol="0" anchor="ctr"/>
+          <a:lstStyle/>
+          <a:p>
+            <a:pPr algn="ctr"/>
+            <a:endParaRPr lang="de-DE"/>
+          </a:p>
+        </p:txBody>
+      </p:sp>
+    </p:spTree>
+    <p:extLst>
+      <p:ext uri="{BB962C8B-B14F-4D97-AF65-F5344CB8AC3E}">
+        <p14:creationId xmlns:p14="http://schemas.microsoft.com/office/powerpoint/2010/main" val="1664050131"/>
+      </p:ext>
+    </p:extLst>
+  </p:cSld>
+  <p:clrMapOvr>
+    <a:masterClrMapping/>
+  </p:clrMapOvr>
+</p:sld>
+</file>
+
+<file path=ppt/slides/slide11.xml><?xml version="1.0" encoding="utf-8"?>
+<p:sld xmlns:a="http://schemas.openxmlformats.org/drawingml/2006/main" xmlns:r="http://schemas.openxmlformats.org/officeDocument/2006/relationships" xmlns:p="http://schemas.openxmlformats.org/presentationml/2006/main">
+  <p:cSld>
+    <p:spTree>
+      <p:nvGrpSpPr>
+        <p:cNvPr id="1" name=""/>
+        <p:cNvGrpSpPr/>
+        <p:nvPr/>
+      </p:nvGrpSpPr>
+      <p:grpSpPr>
+        <a:xfrm>
+          <a:off x="0" y="0"/>
+          <a:ext cx="0" cy="0"/>
+          <a:chOff x="0" y="0"/>
+          <a:chExt cx="0" cy="0"/>
+        </a:xfrm>
+      </p:grpSpPr>
+      <p:sp>
+        <p:nvSpPr>
+          <p:cNvPr id="2" name="Titel 1">
+            <a:extLst>
+              <a:ext uri="{FF2B5EF4-FFF2-40B4-BE49-F238E27FC236}">
+                <a16:creationId xmlns:a16="http://schemas.microsoft.com/office/drawing/2014/main" id="{89F8F65B-2650-5045-B541-28FD8D8E450B}"/>
+              </a:ext>
+            </a:extLst>
+          </p:cNvPr>
+          <p:cNvSpPr>
+            <a:spLocks noGrp="1"/>
+          </p:cNvSpPr>
+          <p:nvPr>
+            <p:ph type="title"/>
+          </p:nvPr>
+        </p:nvSpPr>
+        <p:spPr/>
+        <p:txBody>
+          <a:bodyPr/>
+          <a:lstStyle/>
+          <a:p>
+            <a:endParaRPr lang="de-DE"/>
+          </a:p>
+        </p:txBody>
+      </p:sp>
+      <p:sp>
+        <p:nvSpPr>
+          <p:cNvPr id="3" name="Inhaltsplatzhalter 2">
+            <a:extLst>
+              <a:ext uri="{FF2B5EF4-FFF2-40B4-BE49-F238E27FC236}">
+                <a16:creationId xmlns:a16="http://schemas.microsoft.com/office/drawing/2014/main" id="{F7C6C780-75F7-4650-92BE-55E4B45E3C8C}"/>
+              </a:ext>
+            </a:extLst>
+          </p:cNvPr>
+          <p:cNvSpPr>
+            <a:spLocks noGrp="1"/>
+          </p:cNvSpPr>
+          <p:nvPr>
+            <p:ph idx="1"/>
+          </p:nvPr>
+        </p:nvSpPr>
+        <p:spPr/>
+        <p:txBody>
+          <a:bodyPr/>
+          <a:lstStyle/>
+          <a:p>
+            <a:endParaRPr lang="de-DE"/>
+          </a:p>
+        </p:txBody>
+      </p:sp>
+    </p:spTree>
+    <p:extLst>
+      <p:ext uri="{BB962C8B-B14F-4D97-AF65-F5344CB8AC3E}">
+        <p14:creationId xmlns:p14="http://schemas.microsoft.com/office/powerpoint/2010/main" val="1273324695"/>
+      </p:ext>
+    </p:extLst>
+  </p:cSld>
+  <p:clrMapOvr>
+    <a:masterClrMapping/>
+  </p:clrMapOvr>
 </p:sld>
 </file>
 
@@ -3268,45 +3787,86 @@
           <a:chExt cx="0" cy="0"/>
         </a:xfrm>
       </p:grpSpPr>
+      <p:sp>
+        <p:nvSpPr>
+          <p:cNvPr id="3" name="Rechteck 2">
+            <a:extLst>
+              <a:ext uri="{FF2B5EF4-FFF2-40B4-BE49-F238E27FC236}">
+                <a16:creationId xmlns:a16="http://schemas.microsoft.com/office/drawing/2014/main" id="{A6366694-3BAC-30BC-370E-70D8977F7826}"/>
+              </a:ext>
+            </a:extLst>
+          </p:cNvPr>
+          <p:cNvSpPr/>
+          <p:nvPr/>
+        </p:nvSpPr>
+        <p:spPr>
+          <a:xfrm>
+            <a:off x="-1414884" y="-1035496"/>
+            <a:ext cx="10801200" cy="8136904"/>
+          </a:xfrm>
+          <a:prstGeom prst="rect">
+            <a:avLst/>
+          </a:prstGeom>
+        </p:spPr>
+        <p:style>
+          <a:lnRef idx="2">
+            <a:schemeClr val="accent1">
+              <a:shade val="15000"/>
+            </a:schemeClr>
+          </a:lnRef>
+          <a:fillRef idx="1">
+            <a:schemeClr val="accent1"/>
+          </a:fillRef>
+          <a:effectRef idx="0">
+            <a:schemeClr val="accent1"/>
+          </a:effectRef>
+          <a:fontRef idx="minor">
+            <a:schemeClr val="lt1"/>
+          </a:fontRef>
+        </p:style>
+        <p:txBody>
+          <a:bodyPr rtlCol="0" anchor="ctr"/>
+          <a:lstStyle/>
+          <a:p>
+            <a:pPr algn="ctr"/>
+            <a:endParaRPr lang="de-DE"/>
+          </a:p>
+        </p:txBody>
+      </p:sp>
       <p:pic>
         <p:nvPicPr>
-          <p:cNvPr id="1030" name="Picture 6" descr="Symbole &amp; Icons zum Thema &quot;Home&quot; | Canva"/>
+          <p:cNvPr id="2" name="Grafik 1" descr="Start mit einfarbiger Füllung">
+            <a:extLst>
+              <a:ext uri="{FF2B5EF4-FFF2-40B4-BE49-F238E27FC236}">
+                <a16:creationId xmlns:a16="http://schemas.microsoft.com/office/drawing/2014/main" id="{A9229744-B814-A89C-00C4-6989F4157094}"/>
+              </a:ext>
+            </a:extLst>
+          </p:cNvPr>
           <p:cNvPicPr>
-            <a:picLocks noChangeAspect="1" noChangeArrowheads="1"/>
+            <a:picLocks noChangeAspect="1"/>
           </p:cNvPicPr>
           <p:nvPr/>
         </p:nvPicPr>
         <p:blipFill>
           <a:blip r:embed="rId2">
             <a:extLst>
-              <a:ext uri="{28A0092B-C50C-407E-A947-70E740481C1C}">
-                <a14:useLocalDpi xmlns:a14="http://schemas.microsoft.com/office/drawing/2010/main" val="0"/>
+              <a:ext uri="{96DAC541-7B7A-43D3-8B79-37D633B846F1}">
+                <asvg:svgBlip xmlns:asvg="http://schemas.microsoft.com/office/drawing/2016/SVG/main" r:embed="rId3"/>
               </a:ext>
             </a:extLst>
           </a:blip>
-          <a:srcRect/>
           <a:stretch>
             <a:fillRect/>
           </a:stretch>
         </p:blipFill>
-        <p:spPr bwMode="auto">
+        <p:spPr>
           <a:xfrm>
-            <a:off x="2627784" y="1988840"/>
-            <a:ext cx="3516143" cy="3273211"/>
+            <a:off x="2267744" y="1653148"/>
+            <a:ext cx="4271458" cy="4271458"/>
           </a:xfrm>
           <a:prstGeom prst="rect">
             <a:avLst/>
           </a:prstGeom>
-          <a:noFill/>
-          <a:extLst>
-            <a:ext uri="{909E8E84-426E-40DD-AFC4-6F175D3DCCD1}">
-              <a14:hiddenFill xmlns:a14="http://schemas.microsoft.com/office/drawing/2010/main">
-                <a:solidFill>
-                  <a:srgbClr val="FFFFFF"/>
-                </a:solidFill>
-              </a14:hiddenFill>
-            </a:ext>
-          </a:extLst>
         </p:spPr>
       </p:pic>
       <p:sp>
@@ -3328,9 +3888,7 @@
           </a:prstGeom>
           <a:ln w="508000" cap="rnd">
             <a:solidFill>
-              <a:schemeClr val="accent6">
-                <a:lumMod val="75000"/>
-              </a:schemeClr>
+              <a:schemeClr val="bg1"/>
             </a:solidFill>
             <a:round/>
             <a:tailEnd type="triangle" w="lg" len="med"/>
@@ -3369,13 +3927,6 @@
   <p:clrMapOvr>
     <a:masterClrMapping/>
   </p:clrMapOvr>
-  <p:timing>
-    <p:tnLst>
-      <p:par>
-        <p:cTn id="1" dur="indefinite" restart="never" nodeType="tmRoot"/>
-      </p:par>
-    </p:tnLst>
-  </p:timing>
 </p:sld>
 </file>
 
@@ -3396,47 +3947,52 @@
           <a:chExt cx="0" cy="0"/>
         </a:xfrm>
       </p:grpSpPr>
-      <p:pic>
-        <p:nvPicPr>
-          <p:cNvPr id="5" name="Picture 2" descr="E:\Projekte\Coding\Controller\GUI_files\resources\crosshair.png"/>
-          <p:cNvPicPr>
-            <a:picLocks noChangeAspect="1" noChangeArrowheads="1"/>
-          </p:cNvPicPr>
-          <p:nvPr/>
-        </p:nvPicPr>
-        <p:blipFill>
-          <a:blip r:embed="rId2">
+      <p:sp>
+        <p:nvSpPr>
+          <p:cNvPr id="14" name="Rechteck 13">
             <a:extLst>
-              <a:ext uri="{28A0092B-C50C-407E-A947-70E740481C1C}">
-                <a14:useLocalDpi xmlns:a14="http://schemas.microsoft.com/office/drawing/2010/main" val="0"/>
+              <a:ext uri="{FF2B5EF4-FFF2-40B4-BE49-F238E27FC236}">
+                <a16:creationId xmlns:a16="http://schemas.microsoft.com/office/drawing/2014/main" id="{0FEE5124-F111-F897-E105-4E783CE80C5B}"/>
               </a:ext>
             </a:extLst>
-          </a:blip>
-          <a:srcRect/>
-          <a:stretch>
-            <a:fillRect/>
-          </a:stretch>
-        </p:blipFill>
-        <p:spPr bwMode="auto">
+          </p:cNvPr>
+          <p:cNvSpPr/>
+          <p:nvPr/>
+        </p:nvSpPr>
+        <p:spPr>
           <a:xfrm>
-            <a:off x="1691680" y="332656"/>
-            <a:ext cx="6756823" cy="6756823"/>
+            <a:off x="-373619" y="-351966"/>
+            <a:ext cx="10801200" cy="8136904"/>
           </a:xfrm>
           <a:prstGeom prst="rect">
             <a:avLst/>
           </a:prstGeom>
-          <a:noFill/>
-          <a:extLst>
-            <a:ext uri="{909E8E84-426E-40DD-AFC4-6F175D3DCCD1}">
-              <a14:hiddenFill xmlns:a14="http://schemas.microsoft.com/office/drawing/2010/main">
-                <a:solidFill>
-                  <a:srgbClr val="FFFFFF"/>
-                </a:solidFill>
-              </a14:hiddenFill>
-            </a:ext>
-          </a:extLst>
         </p:spPr>
-      </p:pic>
+        <p:style>
+          <a:lnRef idx="2">
+            <a:schemeClr val="accent1">
+              <a:shade val="15000"/>
+            </a:schemeClr>
+          </a:lnRef>
+          <a:fillRef idx="1">
+            <a:schemeClr val="accent1"/>
+          </a:fillRef>
+          <a:effectRef idx="0">
+            <a:schemeClr val="accent1"/>
+          </a:effectRef>
+          <a:fontRef idx="minor">
+            <a:schemeClr val="lt1"/>
+          </a:fontRef>
+        </p:style>
+        <p:txBody>
+          <a:bodyPr rtlCol="0" anchor="ctr"/>
+          <a:lstStyle/>
+          <a:p>
+            <a:pPr algn="ctr"/>
+            <a:endParaRPr lang="de-DE"/>
+          </a:p>
+        </p:txBody>
+      </p:sp>
       <p:grpSp>
         <p:nvGrpSpPr>
           <p:cNvPr id="2" name="Gruppieren 1"/>
@@ -3470,9 +4026,7 @@
             </a:prstGeom>
             <a:ln w="381000" cap="rnd">
               <a:solidFill>
-                <a:schemeClr val="accent6">
-                  <a:lumMod val="75000"/>
-                </a:schemeClr>
+                <a:schemeClr val="bg1"/>
               </a:solidFill>
               <a:round/>
               <a:tailEnd type="triangle" w="med" len="med"/>
@@ -3520,9 +4074,7 @@
             </a:prstGeom>
             <a:ln w="381000" cap="rnd">
               <a:solidFill>
-                <a:schemeClr val="accent6">
-                  <a:lumMod val="75000"/>
-                </a:schemeClr>
+                <a:schemeClr val="bg1"/>
               </a:solidFill>
               <a:round/>
               <a:tailEnd type="triangle" w="med" len="med"/>
@@ -3552,6 +4104,357 @@
           </p:txBody>
         </p:sp>
       </p:grpSp>
+      <p:grpSp>
+        <p:nvGrpSpPr>
+          <p:cNvPr id="3" name="Gruppieren 2">
+            <a:extLst>
+              <a:ext uri="{FF2B5EF4-FFF2-40B4-BE49-F238E27FC236}">
+                <a16:creationId xmlns:a16="http://schemas.microsoft.com/office/drawing/2014/main" id="{0458C88E-A640-DA20-302B-89608D04B0E3}"/>
+              </a:ext>
+            </a:extLst>
+          </p:cNvPr>
+          <p:cNvGrpSpPr>
+            <a:grpSpLocks noChangeAspect="1"/>
+          </p:cNvGrpSpPr>
+          <p:nvPr/>
+        </p:nvGrpSpPr>
+        <p:grpSpPr>
+          <a:xfrm>
+            <a:off x="1749717" y="404118"/>
+            <a:ext cx="6624736" cy="6624736"/>
+            <a:chOff x="2483447" y="2725714"/>
+            <a:chExt cx="3790353" cy="3869401"/>
+          </a:xfrm>
+        </p:grpSpPr>
+        <p:sp>
+          <p:nvSpPr>
+            <p:cNvPr id="4" name="Ellipse 3">
+              <a:extLst>
+                <a:ext uri="{FF2B5EF4-FFF2-40B4-BE49-F238E27FC236}">
+                  <a16:creationId xmlns:a16="http://schemas.microsoft.com/office/drawing/2014/main" id="{46B8E33F-79BD-B45F-F0A2-FD188AB11EDE}"/>
+                </a:ext>
+              </a:extLst>
+            </p:cNvPr>
+            <p:cNvSpPr/>
+            <p:nvPr/>
+          </p:nvSpPr>
+          <p:spPr>
+            <a:xfrm>
+              <a:off x="2738539" y="3056553"/>
+              <a:ext cx="3240000" cy="3240000"/>
+            </a:xfrm>
+            <a:prstGeom prst="ellipse">
+              <a:avLst/>
+            </a:prstGeom>
+            <a:noFill/>
+            <a:ln w="174625">
+              <a:solidFill>
+                <a:srgbClr val="E6E6E6"/>
+              </a:solidFill>
+            </a:ln>
+          </p:spPr>
+          <p:style>
+            <a:lnRef idx="2">
+              <a:schemeClr val="accent1">
+                <a:shade val="15000"/>
+              </a:schemeClr>
+            </a:lnRef>
+            <a:fillRef idx="1">
+              <a:schemeClr val="accent1"/>
+            </a:fillRef>
+            <a:effectRef idx="0">
+              <a:schemeClr val="accent1"/>
+            </a:effectRef>
+            <a:fontRef idx="minor">
+              <a:schemeClr val="lt1"/>
+            </a:fontRef>
+          </p:style>
+          <p:txBody>
+            <a:bodyPr rtlCol="0" anchor="ctr"/>
+            <a:lstStyle/>
+            <a:p>
+              <a:pPr algn="ctr"/>
+              <a:endParaRPr lang="de-DE"/>
+            </a:p>
+          </p:txBody>
+        </p:sp>
+        <p:sp>
+          <p:nvSpPr>
+            <p:cNvPr id="8" name="Ellipse 7">
+              <a:extLst>
+                <a:ext uri="{FF2B5EF4-FFF2-40B4-BE49-F238E27FC236}">
+                  <a16:creationId xmlns:a16="http://schemas.microsoft.com/office/drawing/2014/main" id="{4AB1227E-ADE0-7A56-BBDD-14BFD20B5B62}"/>
+                </a:ext>
+              </a:extLst>
+            </p:cNvPr>
+            <p:cNvSpPr/>
+            <p:nvPr/>
+          </p:nvSpPr>
+          <p:spPr>
+            <a:xfrm>
+              <a:off x="3278539" y="3597624"/>
+              <a:ext cx="2160000" cy="2160000"/>
+            </a:xfrm>
+            <a:prstGeom prst="ellipse">
+              <a:avLst/>
+            </a:prstGeom>
+            <a:noFill/>
+            <a:ln w="174625">
+              <a:solidFill>
+                <a:srgbClr val="E6E6E6"/>
+              </a:solidFill>
+            </a:ln>
+          </p:spPr>
+          <p:style>
+            <a:lnRef idx="2">
+              <a:schemeClr val="accent1">
+                <a:shade val="15000"/>
+              </a:schemeClr>
+            </a:lnRef>
+            <a:fillRef idx="1">
+              <a:schemeClr val="accent1"/>
+            </a:fillRef>
+            <a:effectRef idx="0">
+              <a:schemeClr val="accent1"/>
+            </a:effectRef>
+            <a:fontRef idx="minor">
+              <a:schemeClr val="lt1"/>
+            </a:fontRef>
+          </p:style>
+          <p:txBody>
+            <a:bodyPr rtlCol="0" anchor="ctr"/>
+            <a:lstStyle/>
+            <a:p>
+              <a:pPr algn="ctr"/>
+              <a:endParaRPr lang="de-DE"/>
+            </a:p>
+          </p:txBody>
+        </p:sp>
+        <p:sp>
+          <p:nvSpPr>
+            <p:cNvPr id="9" name="Ellipse 8">
+              <a:extLst>
+                <a:ext uri="{FF2B5EF4-FFF2-40B4-BE49-F238E27FC236}">
+                  <a16:creationId xmlns:a16="http://schemas.microsoft.com/office/drawing/2014/main" id="{348E9023-12A2-0980-AABF-6F087CC4ECA3}"/>
+                </a:ext>
+              </a:extLst>
+            </p:cNvPr>
+            <p:cNvSpPr/>
+            <p:nvPr/>
+          </p:nvSpPr>
+          <p:spPr>
+            <a:xfrm>
+              <a:off x="4178539" y="4496553"/>
+              <a:ext cx="360000" cy="360000"/>
+            </a:xfrm>
+            <a:prstGeom prst="ellipse">
+              <a:avLst/>
+            </a:prstGeom>
+            <a:noFill/>
+            <a:ln w="174625">
+              <a:solidFill>
+                <a:srgbClr val="E6E6E6"/>
+              </a:solidFill>
+            </a:ln>
+          </p:spPr>
+          <p:style>
+            <a:lnRef idx="2">
+              <a:schemeClr val="accent1">
+                <a:shade val="15000"/>
+              </a:schemeClr>
+            </a:lnRef>
+            <a:fillRef idx="1">
+              <a:schemeClr val="accent1"/>
+            </a:fillRef>
+            <a:effectRef idx="0">
+              <a:schemeClr val="accent1"/>
+            </a:effectRef>
+            <a:fontRef idx="minor">
+              <a:schemeClr val="lt1"/>
+            </a:fontRef>
+          </p:style>
+          <p:txBody>
+            <a:bodyPr rtlCol="0" anchor="ctr"/>
+            <a:lstStyle/>
+            <a:p>
+              <a:pPr algn="ctr"/>
+              <a:endParaRPr lang="de-DE"/>
+            </a:p>
+          </p:txBody>
+        </p:sp>
+        <p:cxnSp>
+          <p:nvCxnSpPr>
+            <p:cNvPr id="10" name="Gerader Verbinder 9">
+              <a:extLst>
+                <a:ext uri="{FF2B5EF4-FFF2-40B4-BE49-F238E27FC236}">
+                  <a16:creationId xmlns:a16="http://schemas.microsoft.com/office/drawing/2014/main" id="{78A2BBCB-CF77-2D12-BED4-CF9309CD92A9}"/>
+                </a:ext>
+              </a:extLst>
+            </p:cNvPr>
+            <p:cNvCxnSpPr>
+              <a:cxnSpLocks/>
+            </p:cNvCxnSpPr>
+            <p:nvPr/>
+          </p:nvCxnSpPr>
+          <p:spPr>
+            <a:xfrm>
+              <a:off x="5137747" y="4689253"/>
+              <a:ext cx="1136053" cy="0"/>
+            </a:xfrm>
+            <a:prstGeom prst="line">
+              <a:avLst/>
+            </a:prstGeom>
+            <a:ln w="174625" cap="rnd">
+              <a:solidFill>
+                <a:srgbClr val="E6E6E6"/>
+              </a:solidFill>
+            </a:ln>
+          </p:spPr>
+          <p:style>
+            <a:lnRef idx="1">
+              <a:schemeClr val="accent1"/>
+            </a:lnRef>
+            <a:fillRef idx="0">
+              <a:schemeClr val="accent1"/>
+            </a:fillRef>
+            <a:effectRef idx="0">
+              <a:schemeClr val="accent1"/>
+            </a:effectRef>
+            <a:fontRef idx="minor">
+              <a:schemeClr val="tx1"/>
+            </a:fontRef>
+          </p:style>
+        </p:cxnSp>
+        <p:cxnSp>
+          <p:nvCxnSpPr>
+            <p:cNvPr id="11" name="Gerader Verbinder 10">
+              <a:extLst>
+                <a:ext uri="{FF2B5EF4-FFF2-40B4-BE49-F238E27FC236}">
+                  <a16:creationId xmlns:a16="http://schemas.microsoft.com/office/drawing/2014/main" id="{A0E95342-5026-0246-C487-03561A30B50B}"/>
+                </a:ext>
+              </a:extLst>
+            </p:cNvPr>
+            <p:cNvCxnSpPr>
+              <a:cxnSpLocks/>
+            </p:cNvCxnSpPr>
+            <p:nvPr/>
+          </p:nvCxnSpPr>
+          <p:spPr>
+            <a:xfrm>
+              <a:off x="2483447" y="4689253"/>
+              <a:ext cx="1136053" cy="0"/>
+            </a:xfrm>
+            <a:prstGeom prst="line">
+              <a:avLst/>
+            </a:prstGeom>
+            <a:ln w="174625" cap="rnd">
+              <a:solidFill>
+                <a:srgbClr val="E6E6E6"/>
+              </a:solidFill>
+            </a:ln>
+          </p:spPr>
+          <p:style>
+            <a:lnRef idx="1">
+              <a:schemeClr val="accent1"/>
+            </a:lnRef>
+            <a:fillRef idx="0">
+              <a:schemeClr val="accent1"/>
+            </a:fillRef>
+            <a:effectRef idx="0">
+              <a:schemeClr val="accent1"/>
+            </a:effectRef>
+            <a:fontRef idx="minor">
+              <a:schemeClr val="tx1"/>
+            </a:fontRef>
+          </p:style>
+        </p:cxnSp>
+        <p:cxnSp>
+          <p:nvCxnSpPr>
+            <p:cNvPr id="12" name="Gerader Verbinder 11">
+              <a:extLst>
+                <a:ext uri="{FF2B5EF4-FFF2-40B4-BE49-F238E27FC236}">
+                  <a16:creationId xmlns:a16="http://schemas.microsoft.com/office/drawing/2014/main" id="{3D3701A3-0F6B-90D0-CB2F-B171FE4F1CD2}"/>
+                </a:ext>
+              </a:extLst>
+            </p:cNvPr>
+            <p:cNvCxnSpPr>
+              <a:cxnSpLocks/>
+            </p:cNvCxnSpPr>
+            <p:nvPr/>
+          </p:nvCxnSpPr>
+          <p:spPr>
+            <a:xfrm rot="5400000">
+              <a:off x="3800773" y="3293741"/>
+              <a:ext cx="1136053" cy="0"/>
+            </a:xfrm>
+            <a:prstGeom prst="line">
+              <a:avLst/>
+            </a:prstGeom>
+            <a:ln w="174625" cap="rnd">
+              <a:solidFill>
+                <a:srgbClr val="E6E6E6"/>
+              </a:solidFill>
+            </a:ln>
+          </p:spPr>
+          <p:style>
+            <a:lnRef idx="1">
+              <a:schemeClr val="accent1"/>
+            </a:lnRef>
+            <a:fillRef idx="0">
+              <a:schemeClr val="accent1"/>
+            </a:fillRef>
+            <a:effectRef idx="0">
+              <a:schemeClr val="accent1"/>
+            </a:effectRef>
+            <a:fontRef idx="minor">
+              <a:schemeClr val="tx1"/>
+            </a:fontRef>
+          </p:style>
+        </p:cxnSp>
+        <p:cxnSp>
+          <p:nvCxnSpPr>
+            <p:cNvPr id="13" name="Gerader Verbinder 12">
+              <a:extLst>
+                <a:ext uri="{FF2B5EF4-FFF2-40B4-BE49-F238E27FC236}">
+                  <a16:creationId xmlns:a16="http://schemas.microsoft.com/office/drawing/2014/main" id="{87724263-BB60-7855-7894-BD9C68CE3F36}"/>
+                </a:ext>
+              </a:extLst>
+            </p:cNvPr>
+            <p:cNvCxnSpPr>
+              <a:cxnSpLocks/>
+            </p:cNvCxnSpPr>
+            <p:nvPr/>
+          </p:nvCxnSpPr>
+          <p:spPr>
+            <a:xfrm rot="5400000">
+              <a:off x="3800773" y="6027089"/>
+              <a:ext cx="1136053" cy="0"/>
+            </a:xfrm>
+            <a:prstGeom prst="line">
+              <a:avLst/>
+            </a:prstGeom>
+            <a:ln w="174625" cap="rnd">
+              <a:solidFill>
+                <a:srgbClr val="E6E6E6"/>
+              </a:solidFill>
+            </a:ln>
+          </p:spPr>
+          <p:style>
+            <a:lnRef idx="1">
+              <a:schemeClr val="accent1"/>
+            </a:lnRef>
+            <a:fillRef idx="0">
+              <a:schemeClr val="accent1"/>
+            </a:fillRef>
+            <a:effectRef idx="0">
+              <a:schemeClr val="accent1"/>
+            </a:effectRef>
+            <a:fontRef idx="minor">
+              <a:schemeClr val="tx1"/>
+            </a:fontRef>
+          </p:style>
+        </p:cxnSp>
+      </p:grpSp>
     </p:spTree>
     <p:extLst>
       <p:ext uri="{BB962C8B-B14F-4D97-AF65-F5344CB8AC3E}">
@@ -3562,13 +4465,6 @@
   <p:clrMapOvr>
     <a:masterClrMapping/>
   </p:clrMapOvr>
-  <p:timing>
-    <p:tnLst>
-      <p:par>
-        <p:cTn id="1" dur="indefinite" restart="never" nodeType="tmRoot"/>
-      </p:par>
-    </p:tnLst>
-  </p:timing>
 </p:sld>
 </file>
 
@@ -3589,6 +4485,52 @@
           <a:chExt cx="0" cy="0"/>
         </a:xfrm>
       </p:grpSpPr>
+      <p:sp>
+        <p:nvSpPr>
+          <p:cNvPr id="4" name="Rechteck 3">
+            <a:extLst>
+              <a:ext uri="{FF2B5EF4-FFF2-40B4-BE49-F238E27FC236}">
+                <a16:creationId xmlns:a16="http://schemas.microsoft.com/office/drawing/2014/main" id="{97E7D9F0-1F0F-EF98-5A4B-F0C9A6678B3A}"/>
+              </a:ext>
+            </a:extLst>
+          </p:cNvPr>
+          <p:cNvSpPr/>
+          <p:nvPr/>
+        </p:nvSpPr>
+        <p:spPr>
+          <a:xfrm>
+            <a:off x="-373619" y="-351966"/>
+            <a:ext cx="10801200" cy="8136904"/>
+          </a:xfrm>
+          <a:prstGeom prst="rect">
+            <a:avLst/>
+          </a:prstGeom>
+        </p:spPr>
+        <p:style>
+          <a:lnRef idx="2">
+            <a:schemeClr val="accent1">
+              <a:shade val="15000"/>
+            </a:schemeClr>
+          </a:lnRef>
+          <a:fillRef idx="1">
+            <a:schemeClr val="accent1"/>
+          </a:fillRef>
+          <a:effectRef idx="0">
+            <a:schemeClr val="accent1"/>
+          </a:effectRef>
+          <a:fontRef idx="minor">
+            <a:schemeClr val="lt1"/>
+          </a:fontRef>
+        </p:style>
+        <p:txBody>
+          <a:bodyPr rtlCol="0" anchor="ctr"/>
+          <a:lstStyle/>
+          <a:p>
+            <a:pPr algn="ctr"/>
+            <a:endParaRPr lang="de-DE"/>
+          </a:p>
+        </p:txBody>
+      </p:sp>
       <p:grpSp>
         <p:nvGrpSpPr>
           <p:cNvPr id="2" name="Gruppieren 1"/>
@@ -3622,9 +4564,7 @@
             </a:prstGeom>
             <a:ln w="381000" cap="rnd">
               <a:solidFill>
-                <a:schemeClr val="accent6">
-                  <a:lumMod val="75000"/>
-                </a:schemeClr>
+                <a:schemeClr val="bg1"/>
               </a:solidFill>
               <a:round/>
               <a:tailEnd type="triangle" w="med" len="med"/>
@@ -3672,9 +4612,7 @@
             </a:prstGeom>
             <a:ln w="381000" cap="rnd">
               <a:solidFill>
-                <a:schemeClr val="accent6">
-                  <a:lumMod val="75000"/>
-                </a:schemeClr>
+                <a:schemeClr val="bg1"/>
               </a:solidFill>
               <a:round/>
               <a:tailEnd type="triangle" w="med" len="med"/>
@@ -3706,43 +4644,38 @@
       </p:grpSp>
       <p:pic>
         <p:nvPicPr>
-          <p:cNvPr id="8" name="Picture 6" descr="Symbole &amp; Icons zum Thema &quot;Home&quot; | Canva"/>
+          <p:cNvPr id="3" name="Grafik 2" descr="Start mit einfarbiger Füllung">
+            <a:extLst>
+              <a:ext uri="{FF2B5EF4-FFF2-40B4-BE49-F238E27FC236}">
+                <a16:creationId xmlns:a16="http://schemas.microsoft.com/office/drawing/2014/main" id="{B7879E60-A02A-14DF-7BAA-54896B009FD0}"/>
+              </a:ext>
+            </a:extLst>
+          </p:cNvPr>
           <p:cNvPicPr>
-            <a:picLocks noChangeAspect="1" noChangeArrowheads="1"/>
+            <a:picLocks noChangeAspect="1"/>
           </p:cNvPicPr>
           <p:nvPr/>
         </p:nvPicPr>
         <p:blipFill>
           <a:blip r:embed="rId2">
             <a:extLst>
-              <a:ext uri="{28A0092B-C50C-407E-A947-70E740481C1C}">
-                <a14:useLocalDpi xmlns:a14="http://schemas.microsoft.com/office/drawing/2010/main" val="0"/>
+              <a:ext uri="{96DAC541-7B7A-43D3-8B79-37D633B846F1}">
+                <asvg:svgBlip xmlns:asvg="http://schemas.microsoft.com/office/drawing/2016/SVG/main" r:embed="rId3"/>
               </a:ext>
             </a:extLst>
           </a:blip>
-          <a:srcRect/>
           <a:stretch>
             <a:fillRect/>
           </a:stretch>
         </p:blipFill>
-        <p:spPr bwMode="auto">
+        <p:spPr>
           <a:xfrm>
-            <a:off x="2339173" y="764704"/>
-            <a:ext cx="5472633" cy="5094527"/>
+            <a:off x="1259632" y="-531440"/>
+            <a:ext cx="7541563" cy="7541563"/>
           </a:xfrm>
           <a:prstGeom prst="rect">
             <a:avLst/>
           </a:prstGeom>
-          <a:noFill/>
-          <a:extLst>
-            <a:ext uri="{909E8E84-426E-40DD-AFC4-6F175D3DCCD1}">
-              <a14:hiddenFill xmlns:a14="http://schemas.microsoft.com/office/drawing/2010/main">
-                <a:solidFill>
-                  <a:srgbClr val="FFFFFF"/>
-                </a:solidFill>
-              </a14:hiddenFill>
-            </a:ext>
-          </a:extLst>
         </p:spPr>
       </p:pic>
     </p:spTree>
@@ -3755,13 +4688,6 @@
   <p:clrMapOvr>
     <a:masterClrMapping/>
   </p:clrMapOvr>
-  <p:timing>
-    <p:tnLst>
-      <p:par>
-        <p:cTn id="1" dur="indefinite" restart="never" nodeType="tmRoot"/>
-      </p:par>
-    </p:tnLst>
-  </p:timing>
 </p:sld>
 </file>
 
@@ -3782,47 +4708,52 @@
           <a:chExt cx="0" cy="0"/>
         </a:xfrm>
       </p:grpSpPr>
-      <p:pic>
-        <p:nvPicPr>
-          <p:cNvPr id="9" name="Picture 2" descr="E:\Projekte\Coding\Controller\GUI_files\resources\crosshair.png"/>
-          <p:cNvPicPr>
-            <a:picLocks noChangeAspect="1" noChangeArrowheads="1"/>
-          </p:cNvPicPr>
-          <p:nvPr/>
-        </p:nvPicPr>
-        <p:blipFill>
-          <a:blip r:embed="rId2">
+      <p:sp>
+        <p:nvSpPr>
+          <p:cNvPr id="17" name="Rechteck 16">
             <a:extLst>
-              <a:ext uri="{28A0092B-C50C-407E-A947-70E740481C1C}">
-                <a14:useLocalDpi xmlns:a14="http://schemas.microsoft.com/office/drawing/2010/main" val="0"/>
+              <a:ext uri="{FF2B5EF4-FFF2-40B4-BE49-F238E27FC236}">
+                <a16:creationId xmlns:a16="http://schemas.microsoft.com/office/drawing/2014/main" id="{06BFA3EA-2125-9693-C6A3-4F43E918DDAE}"/>
               </a:ext>
             </a:extLst>
-          </a:blip>
-          <a:srcRect/>
-          <a:stretch>
-            <a:fillRect/>
-          </a:stretch>
-        </p:blipFill>
-        <p:spPr bwMode="auto">
+          </p:cNvPr>
+          <p:cNvSpPr/>
+          <p:nvPr/>
+        </p:nvSpPr>
+        <p:spPr>
           <a:xfrm>
-            <a:off x="1691680" y="332656"/>
-            <a:ext cx="6756823" cy="6756823"/>
+            <a:off x="-688220" y="-351966"/>
+            <a:ext cx="10801200" cy="8136904"/>
           </a:xfrm>
           <a:prstGeom prst="rect">
             <a:avLst/>
           </a:prstGeom>
-          <a:noFill/>
-          <a:extLst>
-            <a:ext uri="{909E8E84-426E-40DD-AFC4-6F175D3DCCD1}">
-              <a14:hiddenFill xmlns:a14="http://schemas.microsoft.com/office/drawing/2010/main">
-                <a:solidFill>
-                  <a:srgbClr val="FFFFFF"/>
-                </a:solidFill>
-              </a14:hiddenFill>
-            </a:ext>
-          </a:extLst>
         </p:spPr>
-      </p:pic>
+        <p:style>
+          <a:lnRef idx="2">
+            <a:schemeClr val="accent1">
+              <a:shade val="15000"/>
+            </a:schemeClr>
+          </a:lnRef>
+          <a:fillRef idx="1">
+            <a:schemeClr val="accent1"/>
+          </a:fillRef>
+          <a:effectRef idx="0">
+            <a:schemeClr val="accent1"/>
+          </a:effectRef>
+          <a:fontRef idx="minor">
+            <a:schemeClr val="lt1"/>
+          </a:fontRef>
+        </p:style>
+        <p:txBody>
+          <a:bodyPr rtlCol="0" anchor="ctr"/>
+          <a:lstStyle/>
+          <a:p>
+            <a:pPr algn="ctr"/>
+            <a:endParaRPr lang="de-DE"/>
+          </a:p>
+        </p:txBody>
+      </p:sp>
       <p:grpSp>
         <p:nvGrpSpPr>
           <p:cNvPr id="2" name="Gruppieren 1"/>
@@ -3856,9 +4787,7 @@
             </a:prstGeom>
             <a:ln w="381000" cap="rnd">
               <a:solidFill>
-                <a:schemeClr val="accent6">
-                  <a:lumMod val="75000"/>
-                </a:schemeClr>
+                <a:schemeClr val="bg1"/>
               </a:solidFill>
               <a:round/>
               <a:tailEnd type="triangle" w="med" len="med"/>
@@ -3906,9 +4835,7 @@
             </a:prstGeom>
             <a:ln w="381000" cap="rnd">
               <a:solidFill>
-                <a:schemeClr val="accent6">
-                  <a:lumMod val="75000"/>
-                </a:schemeClr>
+                <a:schemeClr val="bg1"/>
               </a:solidFill>
               <a:round/>
               <a:tailEnd type="triangle" w="med" len="med"/>
@@ -3938,52 +4865,391 @@
           </p:txBody>
         </p:sp>
       </p:grpSp>
+      <p:grpSp>
+        <p:nvGrpSpPr>
+          <p:cNvPr id="5" name="Gruppieren 4">
+            <a:extLst>
+              <a:ext uri="{FF2B5EF4-FFF2-40B4-BE49-F238E27FC236}">
+                <a16:creationId xmlns:a16="http://schemas.microsoft.com/office/drawing/2014/main" id="{80761569-B63F-00E1-08B6-66A0539F3E5C}"/>
+              </a:ext>
+            </a:extLst>
+          </p:cNvPr>
+          <p:cNvGrpSpPr>
+            <a:grpSpLocks noChangeAspect="1"/>
+          </p:cNvGrpSpPr>
+          <p:nvPr/>
+        </p:nvGrpSpPr>
+        <p:grpSpPr>
+          <a:xfrm>
+            <a:off x="1749717" y="404118"/>
+            <a:ext cx="6624736" cy="6624736"/>
+            <a:chOff x="2483447" y="2725714"/>
+            <a:chExt cx="3790353" cy="3869401"/>
+          </a:xfrm>
+        </p:grpSpPr>
+        <p:sp>
+          <p:nvSpPr>
+            <p:cNvPr id="10" name="Ellipse 9">
+              <a:extLst>
+                <a:ext uri="{FF2B5EF4-FFF2-40B4-BE49-F238E27FC236}">
+                  <a16:creationId xmlns:a16="http://schemas.microsoft.com/office/drawing/2014/main" id="{BEE1F90D-0285-2F46-039D-9E5A8CE311D7}"/>
+                </a:ext>
+              </a:extLst>
+            </p:cNvPr>
+            <p:cNvSpPr/>
+            <p:nvPr/>
+          </p:nvSpPr>
+          <p:spPr>
+            <a:xfrm>
+              <a:off x="2738539" y="3056553"/>
+              <a:ext cx="3240000" cy="3240000"/>
+            </a:xfrm>
+            <a:prstGeom prst="ellipse">
+              <a:avLst/>
+            </a:prstGeom>
+            <a:noFill/>
+            <a:ln w="174625">
+              <a:solidFill>
+                <a:srgbClr val="E6E6E6"/>
+              </a:solidFill>
+            </a:ln>
+          </p:spPr>
+          <p:style>
+            <a:lnRef idx="2">
+              <a:schemeClr val="accent1">
+                <a:shade val="15000"/>
+              </a:schemeClr>
+            </a:lnRef>
+            <a:fillRef idx="1">
+              <a:schemeClr val="accent1"/>
+            </a:fillRef>
+            <a:effectRef idx="0">
+              <a:schemeClr val="accent1"/>
+            </a:effectRef>
+            <a:fontRef idx="minor">
+              <a:schemeClr val="lt1"/>
+            </a:fontRef>
+          </p:style>
+          <p:txBody>
+            <a:bodyPr rtlCol="0" anchor="ctr"/>
+            <a:lstStyle/>
+            <a:p>
+              <a:pPr algn="ctr"/>
+              <a:endParaRPr lang="de-DE"/>
+            </a:p>
+          </p:txBody>
+        </p:sp>
+        <p:sp>
+          <p:nvSpPr>
+            <p:cNvPr id="11" name="Ellipse 10">
+              <a:extLst>
+                <a:ext uri="{FF2B5EF4-FFF2-40B4-BE49-F238E27FC236}">
+                  <a16:creationId xmlns:a16="http://schemas.microsoft.com/office/drawing/2014/main" id="{4CE146E4-2E2F-5DDA-8F28-3C225B7EE520}"/>
+                </a:ext>
+              </a:extLst>
+            </p:cNvPr>
+            <p:cNvSpPr/>
+            <p:nvPr/>
+          </p:nvSpPr>
+          <p:spPr>
+            <a:xfrm>
+              <a:off x="3278539" y="3597624"/>
+              <a:ext cx="2160000" cy="2160000"/>
+            </a:xfrm>
+            <a:prstGeom prst="ellipse">
+              <a:avLst/>
+            </a:prstGeom>
+            <a:noFill/>
+            <a:ln w="174625">
+              <a:solidFill>
+                <a:srgbClr val="E6E6E6"/>
+              </a:solidFill>
+            </a:ln>
+          </p:spPr>
+          <p:style>
+            <a:lnRef idx="2">
+              <a:schemeClr val="accent1">
+                <a:shade val="15000"/>
+              </a:schemeClr>
+            </a:lnRef>
+            <a:fillRef idx="1">
+              <a:schemeClr val="accent1"/>
+            </a:fillRef>
+            <a:effectRef idx="0">
+              <a:schemeClr val="accent1"/>
+            </a:effectRef>
+            <a:fontRef idx="minor">
+              <a:schemeClr val="lt1"/>
+            </a:fontRef>
+          </p:style>
+          <p:txBody>
+            <a:bodyPr rtlCol="0" anchor="ctr"/>
+            <a:lstStyle/>
+            <a:p>
+              <a:pPr algn="ctr"/>
+              <a:endParaRPr lang="de-DE"/>
+            </a:p>
+          </p:txBody>
+        </p:sp>
+        <p:sp>
+          <p:nvSpPr>
+            <p:cNvPr id="12" name="Ellipse 11">
+              <a:extLst>
+                <a:ext uri="{FF2B5EF4-FFF2-40B4-BE49-F238E27FC236}">
+                  <a16:creationId xmlns:a16="http://schemas.microsoft.com/office/drawing/2014/main" id="{63ECAAF6-3B24-FB5E-FAC7-3A10A72AE374}"/>
+                </a:ext>
+              </a:extLst>
+            </p:cNvPr>
+            <p:cNvSpPr/>
+            <p:nvPr/>
+          </p:nvSpPr>
+          <p:spPr>
+            <a:xfrm>
+              <a:off x="4178539" y="4496553"/>
+              <a:ext cx="360000" cy="360000"/>
+            </a:xfrm>
+            <a:prstGeom prst="ellipse">
+              <a:avLst/>
+            </a:prstGeom>
+            <a:noFill/>
+            <a:ln w="174625">
+              <a:solidFill>
+                <a:srgbClr val="E6E6E6"/>
+              </a:solidFill>
+            </a:ln>
+          </p:spPr>
+          <p:style>
+            <a:lnRef idx="2">
+              <a:schemeClr val="accent1">
+                <a:shade val="15000"/>
+              </a:schemeClr>
+            </a:lnRef>
+            <a:fillRef idx="1">
+              <a:schemeClr val="accent1"/>
+            </a:fillRef>
+            <a:effectRef idx="0">
+              <a:schemeClr val="accent1"/>
+            </a:effectRef>
+            <a:fontRef idx="minor">
+              <a:schemeClr val="lt1"/>
+            </a:fontRef>
+          </p:style>
+          <p:txBody>
+            <a:bodyPr rtlCol="0" anchor="ctr"/>
+            <a:lstStyle/>
+            <a:p>
+              <a:pPr algn="ctr"/>
+              <a:endParaRPr lang="de-DE"/>
+            </a:p>
+          </p:txBody>
+        </p:sp>
+        <p:cxnSp>
+          <p:nvCxnSpPr>
+            <p:cNvPr id="13" name="Gerader Verbinder 12">
+              <a:extLst>
+                <a:ext uri="{FF2B5EF4-FFF2-40B4-BE49-F238E27FC236}">
+                  <a16:creationId xmlns:a16="http://schemas.microsoft.com/office/drawing/2014/main" id="{7B213FB5-9C56-5CD1-9149-DAA4F344272C}"/>
+                </a:ext>
+              </a:extLst>
+            </p:cNvPr>
+            <p:cNvCxnSpPr>
+              <a:cxnSpLocks/>
+            </p:cNvCxnSpPr>
+            <p:nvPr/>
+          </p:nvCxnSpPr>
+          <p:spPr>
+            <a:xfrm>
+              <a:off x="5137747" y="4689253"/>
+              <a:ext cx="1136053" cy="0"/>
+            </a:xfrm>
+            <a:prstGeom prst="line">
+              <a:avLst/>
+            </a:prstGeom>
+            <a:ln w="174625" cap="rnd">
+              <a:solidFill>
+                <a:srgbClr val="E6E6E6"/>
+              </a:solidFill>
+            </a:ln>
+          </p:spPr>
+          <p:style>
+            <a:lnRef idx="1">
+              <a:schemeClr val="accent1"/>
+            </a:lnRef>
+            <a:fillRef idx="0">
+              <a:schemeClr val="accent1"/>
+            </a:fillRef>
+            <a:effectRef idx="0">
+              <a:schemeClr val="accent1"/>
+            </a:effectRef>
+            <a:fontRef idx="minor">
+              <a:schemeClr val="tx1"/>
+            </a:fontRef>
+          </p:style>
+        </p:cxnSp>
+        <p:cxnSp>
+          <p:nvCxnSpPr>
+            <p:cNvPr id="14" name="Gerader Verbinder 13">
+              <a:extLst>
+                <a:ext uri="{FF2B5EF4-FFF2-40B4-BE49-F238E27FC236}">
+                  <a16:creationId xmlns:a16="http://schemas.microsoft.com/office/drawing/2014/main" id="{8CCC60FC-4B66-4A75-6C13-8A637235443B}"/>
+                </a:ext>
+              </a:extLst>
+            </p:cNvPr>
+            <p:cNvCxnSpPr>
+              <a:cxnSpLocks/>
+            </p:cNvCxnSpPr>
+            <p:nvPr/>
+          </p:nvCxnSpPr>
+          <p:spPr>
+            <a:xfrm>
+              <a:off x="2483447" y="4689253"/>
+              <a:ext cx="1136053" cy="0"/>
+            </a:xfrm>
+            <a:prstGeom prst="line">
+              <a:avLst/>
+            </a:prstGeom>
+            <a:ln w="174625" cap="rnd">
+              <a:solidFill>
+                <a:srgbClr val="E6E6E6"/>
+              </a:solidFill>
+            </a:ln>
+          </p:spPr>
+          <p:style>
+            <a:lnRef idx="1">
+              <a:schemeClr val="accent1"/>
+            </a:lnRef>
+            <a:fillRef idx="0">
+              <a:schemeClr val="accent1"/>
+            </a:fillRef>
+            <a:effectRef idx="0">
+              <a:schemeClr val="accent1"/>
+            </a:effectRef>
+            <a:fontRef idx="minor">
+              <a:schemeClr val="tx1"/>
+            </a:fontRef>
+          </p:style>
+        </p:cxnSp>
+        <p:cxnSp>
+          <p:nvCxnSpPr>
+            <p:cNvPr id="15" name="Gerader Verbinder 14">
+              <a:extLst>
+                <a:ext uri="{FF2B5EF4-FFF2-40B4-BE49-F238E27FC236}">
+                  <a16:creationId xmlns:a16="http://schemas.microsoft.com/office/drawing/2014/main" id="{84A6D532-325B-68F3-2F43-A7B779FEBD48}"/>
+                </a:ext>
+              </a:extLst>
+            </p:cNvPr>
+            <p:cNvCxnSpPr>
+              <a:cxnSpLocks/>
+            </p:cNvCxnSpPr>
+            <p:nvPr/>
+          </p:nvCxnSpPr>
+          <p:spPr>
+            <a:xfrm rot="5400000">
+              <a:off x="3800773" y="3293741"/>
+              <a:ext cx="1136053" cy="0"/>
+            </a:xfrm>
+            <a:prstGeom prst="line">
+              <a:avLst/>
+            </a:prstGeom>
+            <a:ln w="174625" cap="rnd">
+              <a:solidFill>
+                <a:srgbClr val="E6E6E6"/>
+              </a:solidFill>
+            </a:ln>
+          </p:spPr>
+          <p:style>
+            <a:lnRef idx="1">
+              <a:schemeClr val="accent1"/>
+            </a:lnRef>
+            <a:fillRef idx="0">
+              <a:schemeClr val="accent1"/>
+            </a:fillRef>
+            <a:effectRef idx="0">
+              <a:schemeClr val="accent1"/>
+            </a:effectRef>
+            <a:fontRef idx="minor">
+              <a:schemeClr val="tx1"/>
+            </a:fontRef>
+          </p:style>
+        </p:cxnSp>
+        <p:cxnSp>
+          <p:nvCxnSpPr>
+            <p:cNvPr id="16" name="Gerader Verbinder 15">
+              <a:extLst>
+                <a:ext uri="{FF2B5EF4-FFF2-40B4-BE49-F238E27FC236}">
+                  <a16:creationId xmlns:a16="http://schemas.microsoft.com/office/drawing/2014/main" id="{7027BD33-E273-079A-39E7-4896D0409B85}"/>
+                </a:ext>
+              </a:extLst>
+            </p:cNvPr>
+            <p:cNvCxnSpPr>
+              <a:cxnSpLocks/>
+            </p:cNvCxnSpPr>
+            <p:nvPr/>
+          </p:nvCxnSpPr>
+          <p:spPr>
+            <a:xfrm rot="5400000">
+              <a:off x="3800773" y="6027089"/>
+              <a:ext cx="1136053" cy="0"/>
+            </a:xfrm>
+            <a:prstGeom prst="line">
+              <a:avLst/>
+            </a:prstGeom>
+            <a:ln w="174625" cap="rnd">
+              <a:solidFill>
+                <a:srgbClr val="E6E6E6"/>
+              </a:solidFill>
+            </a:ln>
+          </p:spPr>
+          <p:style>
+            <a:lnRef idx="1">
+              <a:schemeClr val="accent1"/>
+            </a:lnRef>
+            <a:fillRef idx="0">
+              <a:schemeClr val="accent1"/>
+            </a:fillRef>
+            <a:effectRef idx="0">
+              <a:schemeClr val="accent1"/>
+            </a:effectRef>
+            <a:fontRef idx="minor">
+              <a:schemeClr val="tx1"/>
+            </a:fontRef>
+          </p:style>
+        </p:cxnSp>
+      </p:grpSp>
       <p:pic>
         <p:nvPicPr>
-          <p:cNvPr id="8" name="Picture 6" descr="Symbole &amp; Icons zum Thema &quot;Home&quot; | Canva"/>
+          <p:cNvPr id="4" name="Grafik 3" descr="Start mit einfarbiger Füllung">
+            <a:extLst>
+              <a:ext uri="{FF2B5EF4-FFF2-40B4-BE49-F238E27FC236}">
+                <a16:creationId xmlns:a16="http://schemas.microsoft.com/office/drawing/2014/main" id="{F1AE67FE-9A78-6F91-9161-BF259B890960}"/>
+              </a:ext>
+            </a:extLst>
+          </p:cNvPr>
           <p:cNvPicPr>
-            <a:picLocks noChangeAspect="1" noChangeArrowheads="1"/>
+            <a:picLocks noChangeAspect="1"/>
           </p:cNvPicPr>
           <p:nvPr/>
         </p:nvPicPr>
         <p:blipFill>
-          <a:blip r:embed="rId3">
-            <a:duotone>
-              <a:schemeClr val="accent6">
-                <a:shade val="45000"/>
-                <a:satMod val="135000"/>
-              </a:schemeClr>
-              <a:prstClr val="white"/>
-            </a:duotone>
+          <a:blip r:embed="rId2">
             <a:extLst>
-              <a:ext uri="{28A0092B-C50C-407E-A947-70E740481C1C}">
-                <a14:useLocalDpi xmlns:a14="http://schemas.microsoft.com/office/drawing/2010/main" val="0"/>
+              <a:ext uri="{96DAC541-7B7A-43D3-8B79-37D633B846F1}">
+                <asvg:svgBlip xmlns:asvg="http://schemas.microsoft.com/office/drawing/2016/SVG/main" r:embed="rId3"/>
               </a:ext>
             </a:extLst>
           </a:blip>
-          <a:srcRect/>
           <a:stretch>
             <a:fillRect/>
           </a:stretch>
         </p:blipFill>
-        <p:spPr bwMode="auto">
+        <p:spPr>
           <a:xfrm>
-            <a:off x="4875465" y="3077259"/>
-            <a:ext cx="3126934" cy="2910893"/>
+            <a:off x="4313713" y="2264001"/>
+            <a:ext cx="4271458" cy="4271458"/>
           </a:xfrm>
           <a:prstGeom prst="rect">
             <a:avLst/>
           </a:prstGeom>
-          <a:noFill/>
-          <a:extLst>
-            <a:ext uri="{909E8E84-426E-40DD-AFC4-6F175D3DCCD1}">
-              <a14:hiddenFill xmlns:a14="http://schemas.microsoft.com/office/drawing/2010/main">
-                <a:solidFill>
-                  <a:srgbClr val="FFFFFF"/>
-                </a:solidFill>
-              </a14:hiddenFill>
-            </a:ext>
-          </a:extLst>
         </p:spPr>
       </p:pic>
     </p:spTree>
@@ -3996,13 +5262,466 @@
   <p:clrMapOvr>
     <a:masterClrMapping/>
   </p:clrMapOvr>
-  <p:timing>
-    <p:tnLst>
-      <p:par>
-        <p:cTn id="1" dur="indefinite" restart="never" nodeType="tmRoot"/>
-      </p:par>
-    </p:tnLst>
-  </p:timing>
+</p:sld>
+</file>
+
+<file path=ppt/slides/slide6.xml><?xml version="1.0" encoding="utf-8"?>
+<p:sld xmlns:a="http://schemas.openxmlformats.org/drawingml/2006/main" xmlns:r="http://schemas.openxmlformats.org/officeDocument/2006/relationships" xmlns:p="http://schemas.openxmlformats.org/presentationml/2006/main">
+  <p:cSld>
+    <p:spTree>
+      <p:nvGrpSpPr>
+        <p:cNvPr id="1" name=""/>
+        <p:cNvGrpSpPr/>
+        <p:nvPr/>
+      </p:nvGrpSpPr>
+      <p:grpSpPr>
+        <a:xfrm>
+          <a:off x="0" y="0"/>
+          <a:ext cx="0" cy="0"/>
+          <a:chOff x="0" y="0"/>
+          <a:chExt cx="0" cy="0"/>
+        </a:xfrm>
+      </p:grpSpPr>
+      <p:sp>
+        <p:nvSpPr>
+          <p:cNvPr id="2" name="Titel 1">
+            <a:extLst>
+              <a:ext uri="{FF2B5EF4-FFF2-40B4-BE49-F238E27FC236}">
+                <a16:creationId xmlns:a16="http://schemas.microsoft.com/office/drawing/2014/main" id="{89E09CD7-9049-5715-357C-EB6542454477}"/>
+              </a:ext>
+            </a:extLst>
+          </p:cNvPr>
+          <p:cNvSpPr>
+            <a:spLocks noGrp="1"/>
+          </p:cNvSpPr>
+          <p:nvPr>
+            <p:ph type="title"/>
+          </p:nvPr>
+        </p:nvSpPr>
+        <p:spPr/>
+        <p:txBody>
+          <a:bodyPr/>
+          <a:lstStyle/>
+          <a:p>
+            <a:endParaRPr lang="de-DE"/>
+          </a:p>
+        </p:txBody>
+      </p:sp>
+      <p:sp>
+        <p:nvSpPr>
+          <p:cNvPr id="3" name="Inhaltsplatzhalter 2">
+            <a:extLst>
+              <a:ext uri="{FF2B5EF4-FFF2-40B4-BE49-F238E27FC236}">
+                <a16:creationId xmlns:a16="http://schemas.microsoft.com/office/drawing/2014/main" id="{21C90842-07CE-B759-2BE3-33C97C35C017}"/>
+              </a:ext>
+            </a:extLst>
+          </p:cNvPr>
+          <p:cNvSpPr>
+            <a:spLocks noGrp="1"/>
+          </p:cNvSpPr>
+          <p:nvPr>
+            <p:ph idx="1"/>
+          </p:nvPr>
+        </p:nvSpPr>
+        <p:spPr/>
+        <p:txBody>
+          <a:bodyPr/>
+          <a:lstStyle/>
+          <a:p>
+            <a:endParaRPr lang="de-DE"/>
+          </a:p>
+        </p:txBody>
+      </p:sp>
+    </p:spTree>
+    <p:extLst>
+      <p:ext uri="{BB962C8B-B14F-4D97-AF65-F5344CB8AC3E}">
+        <p14:creationId xmlns:p14="http://schemas.microsoft.com/office/powerpoint/2010/main" val="2924343108"/>
+      </p:ext>
+    </p:extLst>
+  </p:cSld>
+  <p:clrMapOvr>
+    <a:masterClrMapping/>
+  </p:clrMapOvr>
+</p:sld>
+</file>
+
+<file path=ppt/slides/slide7.xml><?xml version="1.0" encoding="utf-8"?>
+<p:sld xmlns:a="http://schemas.openxmlformats.org/drawingml/2006/main" xmlns:r="http://schemas.openxmlformats.org/officeDocument/2006/relationships" xmlns:p="http://schemas.openxmlformats.org/presentationml/2006/main">
+  <p:cSld>
+    <p:spTree>
+      <p:nvGrpSpPr>
+        <p:cNvPr id="1" name=""/>
+        <p:cNvGrpSpPr/>
+        <p:nvPr/>
+      </p:nvGrpSpPr>
+      <p:grpSpPr>
+        <a:xfrm>
+          <a:off x="0" y="0"/>
+          <a:ext cx="0" cy="0"/>
+          <a:chOff x="0" y="0"/>
+          <a:chExt cx="0" cy="0"/>
+        </a:xfrm>
+      </p:grpSpPr>
+      <p:sp>
+        <p:nvSpPr>
+          <p:cNvPr id="6" name="Rechteck 5">
+            <a:extLst>
+              <a:ext uri="{FF2B5EF4-FFF2-40B4-BE49-F238E27FC236}">
+                <a16:creationId xmlns:a16="http://schemas.microsoft.com/office/drawing/2014/main" id="{03FDB82D-4EA5-62E7-041F-D8B1BF4F202E}"/>
+              </a:ext>
+            </a:extLst>
+          </p:cNvPr>
+          <p:cNvSpPr/>
+          <p:nvPr/>
+        </p:nvSpPr>
+        <p:spPr>
+          <a:xfrm>
+            <a:off x="-373619" y="-351966"/>
+            <a:ext cx="10801200" cy="8136904"/>
+          </a:xfrm>
+          <a:prstGeom prst="rect">
+            <a:avLst/>
+          </a:prstGeom>
+        </p:spPr>
+        <p:style>
+          <a:lnRef idx="2">
+            <a:schemeClr val="accent1">
+              <a:shade val="15000"/>
+            </a:schemeClr>
+          </a:lnRef>
+          <a:fillRef idx="1">
+            <a:schemeClr val="accent1"/>
+          </a:fillRef>
+          <a:effectRef idx="0">
+            <a:schemeClr val="accent1"/>
+          </a:effectRef>
+          <a:fontRef idx="minor">
+            <a:schemeClr val="lt1"/>
+          </a:fontRef>
+        </p:style>
+        <p:txBody>
+          <a:bodyPr rtlCol="0" anchor="ctr"/>
+          <a:lstStyle/>
+          <a:p>
+            <a:pPr algn="ctr"/>
+            <a:endParaRPr lang="de-DE"/>
+          </a:p>
+        </p:txBody>
+      </p:sp>
+      <p:pic>
+        <p:nvPicPr>
+          <p:cNvPr id="5" name="Grafik 4" descr="Ein Bild, das Schwarz, Dunkelheit enthält.&#10;&#10;KI-generierte Inhalte können fehlerhaft sein.">
+            <a:extLst>
+              <a:ext uri="{FF2B5EF4-FFF2-40B4-BE49-F238E27FC236}">
+                <a16:creationId xmlns:a16="http://schemas.microsoft.com/office/drawing/2014/main" id="{38A85999-E673-42F4-1203-7DA497515BFB}"/>
+              </a:ext>
+            </a:extLst>
+          </p:cNvPr>
+          <p:cNvPicPr>
+            <a:picLocks noChangeAspect="1"/>
+          </p:cNvPicPr>
+          <p:nvPr/>
+        </p:nvPicPr>
+        <p:blipFill>
+          <a:blip r:embed="rId2">
+            <a:extLst>
+              <a:ext uri="{BEBA8EAE-BF5A-486C-A8C5-ECC9F3942E4B}">
+                <a14:imgProps xmlns:a14="http://schemas.microsoft.com/office/drawing/2010/main">
+                  <a14:imgLayer r:embed="rId3">
+                    <a14:imgEffect>
+                      <a14:saturation sat="102000"/>
+                    </a14:imgEffect>
+                    <a14:imgEffect>
+                      <a14:brightnessContrast bright="100000" contrast="100000"/>
+                    </a14:imgEffect>
+                  </a14:imgLayer>
+                </a14:imgProps>
+              </a:ext>
+              <a:ext uri="{28A0092B-C50C-407E-A947-70E740481C1C}">
+                <a14:useLocalDpi xmlns:a14="http://schemas.microsoft.com/office/drawing/2010/main" val="0"/>
+              </a:ext>
+            </a:extLst>
+          </a:blip>
+          <a:stretch>
+            <a:fillRect/>
+          </a:stretch>
+        </p:blipFill>
+        <p:spPr>
+          <a:xfrm>
+            <a:off x="2339752" y="990905"/>
+            <a:ext cx="4876190" cy="4876190"/>
+          </a:xfrm>
+          <a:prstGeom prst="rect">
+            <a:avLst/>
+          </a:prstGeom>
+          <a:noFill/>
+        </p:spPr>
+      </p:pic>
+    </p:spTree>
+    <p:extLst>
+      <p:ext uri="{BB962C8B-B14F-4D97-AF65-F5344CB8AC3E}">
+        <p14:creationId xmlns:p14="http://schemas.microsoft.com/office/powerpoint/2010/main" val="4197119584"/>
+      </p:ext>
+    </p:extLst>
+  </p:cSld>
+  <p:clrMapOvr>
+    <a:masterClrMapping/>
+  </p:clrMapOvr>
+</p:sld>
+</file>
+
+<file path=ppt/slides/slide8.xml><?xml version="1.0" encoding="utf-8"?>
+<p:sld xmlns:a="http://schemas.openxmlformats.org/drawingml/2006/main" xmlns:r="http://schemas.openxmlformats.org/officeDocument/2006/relationships" xmlns:p="http://schemas.openxmlformats.org/presentationml/2006/main">
+  <p:cSld>
+    <p:spTree>
+      <p:nvGrpSpPr>
+        <p:cNvPr id="1" name="">
+          <a:extLst>
+            <a:ext uri="{FF2B5EF4-FFF2-40B4-BE49-F238E27FC236}">
+              <a16:creationId xmlns:a16="http://schemas.microsoft.com/office/drawing/2014/main" id="{A7957265-6D81-F96A-7B24-5D0E04BC9A97}"/>
+            </a:ext>
+          </a:extLst>
+        </p:cNvPr>
+        <p:cNvGrpSpPr/>
+        <p:nvPr/>
+      </p:nvGrpSpPr>
+      <p:grpSpPr>
+        <a:xfrm>
+          <a:off x="0" y="0"/>
+          <a:ext cx="0" cy="0"/>
+          <a:chOff x="0" y="0"/>
+          <a:chExt cx="0" cy="0"/>
+        </a:xfrm>
+      </p:grpSpPr>
+      <p:sp>
+        <p:nvSpPr>
+          <p:cNvPr id="6" name="Rechteck 5">
+            <a:extLst>
+              <a:ext uri="{FF2B5EF4-FFF2-40B4-BE49-F238E27FC236}">
+                <a16:creationId xmlns:a16="http://schemas.microsoft.com/office/drawing/2014/main" id="{7B18418F-C166-B9C1-BBCA-D446C4FDA8E5}"/>
+              </a:ext>
+            </a:extLst>
+          </p:cNvPr>
+          <p:cNvSpPr/>
+          <p:nvPr/>
+        </p:nvSpPr>
+        <p:spPr>
+          <a:xfrm>
+            <a:off x="-373619" y="-351966"/>
+            <a:ext cx="10801200" cy="8136904"/>
+          </a:xfrm>
+          <a:prstGeom prst="rect">
+            <a:avLst/>
+          </a:prstGeom>
+        </p:spPr>
+        <p:style>
+          <a:lnRef idx="2">
+            <a:schemeClr val="accent1">
+              <a:shade val="15000"/>
+            </a:schemeClr>
+          </a:lnRef>
+          <a:fillRef idx="1">
+            <a:schemeClr val="accent1"/>
+          </a:fillRef>
+          <a:effectRef idx="0">
+            <a:schemeClr val="accent1"/>
+          </a:effectRef>
+          <a:fontRef idx="minor">
+            <a:schemeClr val="lt1"/>
+          </a:fontRef>
+        </p:style>
+        <p:txBody>
+          <a:bodyPr rtlCol="0" anchor="ctr"/>
+          <a:lstStyle/>
+          <a:p>
+            <a:pPr algn="ctr"/>
+            <a:endParaRPr lang="de-DE"/>
+          </a:p>
+        </p:txBody>
+      </p:sp>
+      <p:pic>
+        <p:nvPicPr>
+          <p:cNvPr id="3" name="Grafik 2" descr="Ein Bild, das Schwarz, Dunkelheit enthält.&#10;&#10;KI-generierte Inhalte können fehlerhaft sein.">
+            <a:extLst>
+              <a:ext uri="{FF2B5EF4-FFF2-40B4-BE49-F238E27FC236}">
+                <a16:creationId xmlns:a16="http://schemas.microsoft.com/office/drawing/2014/main" id="{4877BBFD-E9E0-2C29-10E5-CC690471EC8C}"/>
+              </a:ext>
+            </a:extLst>
+          </p:cNvPr>
+          <p:cNvPicPr>
+            <a:picLocks noChangeAspect="1"/>
+          </p:cNvPicPr>
+          <p:nvPr/>
+        </p:nvPicPr>
+        <p:blipFill>
+          <a:blip r:embed="rId2">
+            <a:extLst>
+              <a:ext uri="{BEBA8EAE-BF5A-486C-A8C5-ECC9F3942E4B}">
+                <a14:imgProps xmlns:a14="http://schemas.microsoft.com/office/drawing/2010/main">
+                  <a14:imgLayer r:embed="rId3">
+                    <a14:imgEffect>
+                      <a14:brightnessContrast bright="100000" contrast="100000"/>
+                    </a14:imgEffect>
+                  </a14:imgLayer>
+                </a14:imgProps>
+              </a:ext>
+              <a:ext uri="{28A0092B-C50C-407E-A947-70E740481C1C}">
+                <a14:useLocalDpi xmlns:a14="http://schemas.microsoft.com/office/drawing/2010/main" val="0"/>
+              </a:ext>
+            </a:extLst>
+          </a:blip>
+          <a:stretch>
+            <a:fillRect/>
+          </a:stretch>
+        </p:blipFill>
+        <p:spPr>
+          <a:xfrm>
+            <a:off x="2097241" y="954241"/>
+            <a:ext cx="4949517" cy="4949517"/>
+          </a:xfrm>
+          <a:prstGeom prst="rect">
+            <a:avLst/>
+          </a:prstGeom>
+        </p:spPr>
+      </p:pic>
+    </p:spTree>
+    <p:extLst>
+      <p:ext uri="{BB962C8B-B14F-4D97-AF65-F5344CB8AC3E}">
+        <p14:creationId xmlns:p14="http://schemas.microsoft.com/office/powerpoint/2010/main" val="2658453487"/>
+      </p:ext>
+    </p:extLst>
+  </p:cSld>
+  <p:clrMapOvr>
+    <a:masterClrMapping/>
+  </p:clrMapOvr>
+</p:sld>
+</file>
+
+<file path=ppt/slides/slide9.xml><?xml version="1.0" encoding="utf-8"?>
+<p:sld xmlns:a="http://schemas.openxmlformats.org/drawingml/2006/main" xmlns:r="http://schemas.openxmlformats.org/officeDocument/2006/relationships" xmlns:p="http://schemas.openxmlformats.org/presentationml/2006/main">
+  <p:cSld>
+    <p:spTree>
+      <p:nvGrpSpPr>
+        <p:cNvPr id="1" name=""/>
+        <p:cNvGrpSpPr/>
+        <p:nvPr/>
+      </p:nvGrpSpPr>
+      <p:grpSpPr>
+        <a:xfrm>
+          <a:off x="0" y="0"/>
+          <a:ext cx="0" cy="0"/>
+          <a:chOff x="0" y="0"/>
+          <a:chExt cx="0" cy="0"/>
+        </a:xfrm>
+      </p:grpSpPr>
+      <p:sp>
+        <p:nvSpPr>
+          <p:cNvPr id="10" name="Rechteck 9">
+            <a:extLst>
+              <a:ext uri="{FF2B5EF4-FFF2-40B4-BE49-F238E27FC236}">
+                <a16:creationId xmlns:a16="http://schemas.microsoft.com/office/drawing/2014/main" id="{E2609039-AC47-AC03-5404-075923C5FFDE}"/>
+              </a:ext>
+            </a:extLst>
+          </p:cNvPr>
+          <p:cNvSpPr/>
+          <p:nvPr/>
+        </p:nvSpPr>
+        <p:spPr>
+          <a:xfrm>
+            <a:off x="-373619" y="-351966"/>
+            <a:ext cx="10801200" cy="8136904"/>
+          </a:xfrm>
+          <a:prstGeom prst="rect">
+            <a:avLst/>
+          </a:prstGeom>
+        </p:spPr>
+        <p:style>
+          <a:lnRef idx="2">
+            <a:schemeClr val="accent1">
+              <a:shade val="15000"/>
+            </a:schemeClr>
+          </a:lnRef>
+          <a:fillRef idx="1">
+            <a:schemeClr val="accent1"/>
+          </a:fillRef>
+          <a:effectRef idx="0">
+            <a:schemeClr val="accent1"/>
+          </a:effectRef>
+          <a:fontRef idx="minor">
+            <a:schemeClr val="lt1"/>
+          </a:fontRef>
+        </p:style>
+        <p:txBody>
+          <a:bodyPr rtlCol="0" anchor="ctr"/>
+          <a:lstStyle/>
+          <a:p>
+            <a:pPr algn="ctr"/>
+            <a:endParaRPr lang="de-DE"/>
+          </a:p>
+        </p:txBody>
+      </p:sp>
+      <p:sp>
+        <p:nvSpPr>
+          <p:cNvPr id="9" name="Gleichschenkliges Dreieck 8">
+            <a:extLst>
+              <a:ext uri="{FF2B5EF4-FFF2-40B4-BE49-F238E27FC236}">
+                <a16:creationId xmlns:a16="http://schemas.microsoft.com/office/drawing/2014/main" id="{14239D96-C3B7-3DE1-3B18-70F4471CA0DA}"/>
+              </a:ext>
+            </a:extLst>
+          </p:cNvPr>
+          <p:cNvSpPr/>
+          <p:nvPr/>
+        </p:nvSpPr>
+        <p:spPr>
+          <a:xfrm rot="5400000">
+            <a:off x="2699792" y="1988840"/>
+            <a:ext cx="4536504" cy="3816424"/>
+          </a:xfrm>
+          <a:prstGeom prst="triangle">
+            <a:avLst/>
+          </a:prstGeom>
+          <a:solidFill>
+            <a:schemeClr val="bg1"/>
+          </a:solidFill>
+          <a:ln>
+            <a:noFill/>
+          </a:ln>
+        </p:spPr>
+        <p:style>
+          <a:lnRef idx="2">
+            <a:schemeClr val="accent1">
+              <a:shade val="15000"/>
+            </a:schemeClr>
+          </a:lnRef>
+          <a:fillRef idx="1">
+            <a:schemeClr val="accent1"/>
+          </a:fillRef>
+          <a:effectRef idx="0">
+            <a:schemeClr val="accent1"/>
+          </a:effectRef>
+          <a:fontRef idx="minor">
+            <a:schemeClr val="lt1"/>
+          </a:fontRef>
+        </p:style>
+        <p:txBody>
+          <a:bodyPr rtlCol="0" anchor="ctr"/>
+          <a:lstStyle/>
+          <a:p>
+            <a:pPr algn="ctr"/>
+            <a:endParaRPr lang="de-DE"/>
+          </a:p>
+        </p:txBody>
+      </p:sp>
+    </p:spTree>
+    <p:extLst>
+      <p:ext uri="{BB962C8B-B14F-4D97-AF65-F5344CB8AC3E}">
+        <p14:creationId xmlns:p14="http://schemas.microsoft.com/office/powerpoint/2010/main" val="4248010694"/>
+      </p:ext>
+    </p:extLst>
+  </p:cSld>
+  <p:clrMapOvr>
+    <a:masterClrMapping/>
+  </p:clrMapOvr>
 </p:sld>
 </file>
 

</xml_diff>